<commit_message>
Changed URLs for portfolio apps
</commit_message>
<xml_diff>
--- a/karynn_elio_tran.pptx
+++ b/karynn_elio_tran.pptx
@@ -192,7 +192,7 @@
           <a:p>
             <a:fld id="{F792BD2E-E506-8C4C-9620-FA196DD8B430}" type="datetimeFigureOut">
               <a:rPr lang="en-US" smtClean="0"/>
-              <a:t>1/27/15</a:t>
+              <a:t>4/28/15</a:t>
             </a:fld>
             <a:endParaRPr lang="en-US" dirty="0"/>
           </a:p>
@@ -725,7 +725,7 @@
           <a:p>
             <a:fld id="{C3E4E331-40C9-8A41-B115-31D9903399A7}" type="datetimeFigureOut">
               <a:rPr lang="en-US" smtClean="0"/>
-              <a:t>1/27/15</a:t>
+              <a:t>4/28/15</a:t>
             </a:fld>
             <a:endParaRPr lang="en-US" dirty="0"/>
           </a:p>
@@ -895,7 +895,7 @@
           <a:p>
             <a:fld id="{C3E4E331-40C9-8A41-B115-31D9903399A7}" type="datetimeFigureOut">
               <a:rPr lang="en-US" smtClean="0"/>
-              <a:t>1/27/15</a:t>
+              <a:t>4/28/15</a:t>
             </a:fld>
             <a:endParaRPr lang="en-US" dirty="0"/>
           </a:p>
@@ -1075,7 +1075,7 @@
           <a:p>
             <a:fld id="{C3E4E331-40C9-8A41-B115-31D9903399A7}" type="datetimeFigureOut">
               <a:rPr lang="en-US" smtClean="0"/>
-              <a:t>1/27/15</a:t>
+              <a:t>4/28/15</a:t>
             </a:fld>
             <a:endParaRPr lang="en-US" dirty="0"/>
           </a:p>
@@ -1245,7 +1245,7 @@
           <a:p>
             <a:fld id="{C3E4E331-40C9-8A41-B115-31D9903399A7}" type="datetimeFigureOut">
               <a:rPr lang="en-US" smtClean="0"/>
-              <a:t>1/27/15</a:t>
+              <a:t>4/28/15</a:t>
             </a:fld>
             <a:endParaRPr lang="en-US" dirty="0"/>
           </a:p>
@@ -1491,7 +1491,7 @@
           <a:p>
             <a:fld id="{C3E4E331-40C9-8A41-B115-31D9903399A7}" type="datetimeFigureOut">
               <a:rPr lang="en-US" smtClean="0"/>
-              <a:t>1/27/15</a:t>
+              <a:t>4/28/15</a:t>
             </a:fld>
             <a:endParaRPr lang="en-US" dirty="0"/>
           </a:p>
@@ -1779,7 +1779,7 @@
           <a:p>
             <a:fld id="{C3E4E331-40C9-8A41-B115-31D9903399A7}" type="datetimeFigureOut">
               <a:rPr lang="en-US" smtClean="0"/>
-              <a:t>1/27/15</a:t>
+              <a:t>4/28/15</a:t>
             </a:fld>
             <a:endParaRPr lang="en-US" dirty="0"/>
           </a:p>
@@ -2206,7 +2206,7 @@
           <a:p>
             <a:fld id="{C3E4E331-40C9-8A41-B115-31D9903399A7}" type="datetimeFigureOut">
               <a:rPr lang="en-US" smtClean="0"/>
-              <a:t>1/27/15</a:t>
+              <a:t>4/28/15</a:t>
             </a:fld>
             <a:endParaRPr lang="en-US" dirty="0"/>
           </a:p>
@@ -2324,7 +2324,7 @@
           <a:p>
             <a:fld id="{C3E4E331-40C9-8A41-B115-31D9903399A7}" type="datetimeFigureOut">
               <a:rPr lang="en-US" smtClean="0"/>
-              <a:t>1/27/15</a:t>
+              <a:t>4/28/15</a:t>
             </a:fld>
             <a:endParaRPr lang="en-US" dirty="0"/>
           </a:p>
@@ -2419,7 +2419,7 @@
           <a:p>
             <a:fld id="{C3E4E331-40C9-8A41-B115-31D9903399A7}" type="datetimeFigureOut">
               <a:rPr lang="en-US" smtClean="0"/>
-              <a:t>1/27/15</a:t>
+              <a:t>4/28/15</a:t>
             </a:fld>
             <a:endParaRPr lang="en-US" dirty="0"/>
           </a:p>
@@ -2696,7 +2696,7 @@
           <a:p>
             <a:fld id="{C3E4E331-40C9-8A41-B115-31D9903399A7}" type="datetimeFigureOut">
               <a:rPr lang="en-US" smtClean="0"/>
-              <a:t>1/27/15</a:t>
+              <a:t>4/28/15</a:t>
             </a:fld>
             <a:endParaRPr lang="en-US" dirty="0"/>
           </a:p>
@@ -2949,7 +2949,7 @@
           <a:p>
             <a:fld id="{C3E4E331-40C9-8A41-B115-31D9903399A7}" type="datetimeFigureOut">
               <a:rPr lang="en-US" smtClean="0"/>
-              <a:t>1/27/15</a:t>
+              <a:t>4/28/15</a:t>
             </a:fld>
             <a:endParaRPr lang="en-US" dirty="0"/>
           </a:p>
@@ -3162,7 +3162,7 @@
           <a:p>
             <a:fld id="{C3E4E331-40C9-8A41-B115-31D9903399A7}" type="datetimeFigureOut">
               <a:rPr lang="en-US" smtClean="0"/>
-              <a:t>1/27/15</a:t>
+              <a:t>4/28/15</a:t>
             </a:fld>
             <a:endParaRPr lang="en-US" dirty="0"/>
           </a:p>
@@ -3539,14 +3539,61 @@
       </p:grpSpPr>
       <p:sp>
         <p:nvSpPr>
+          <p:cNvPr id="2" name="Rectangle 1"/>
+          <p:cNvSpPr/>
+          <p:nvPr/>
+        </p:nvSpPr>
+        <p:spPr>
+          <a:xfrm>
+            <a:off x="208395" y="917274"/>
+            <a:ext cx="6436385" cy="672574"/>
+          </a:xfrm>
+          <a:prstGeom prst="rect">
+            <a:avLst/>
+          </a:prstGeom>
+          <a:solidFill>
+            <a:schemeClr val="bg1">
+              <a:lumMod val="85000"/>
+            </a:schemeClr>
+          </a:solidFill>
+          <a:ln>
+            <a:noFill/>
+          </a:ln>
+          <a:effectLst/>
+        </p:spPr>
+        <p:style>
+          <a:lnRef idx="1">
+            <a:schemeClr val="accent1"/>
+          </a:lnRef>
+          <a:fillRef idx="3">
+            <a:schemeClr val="accent1"/>
+          </a:fillRef>
+          <a:effectRef idx="2">
+            <a:schemeClr val="accent1"/>
+          </a:effectRef>
+          <a:fontRef idx="minor">
+            <a:schemeClr val="lt1"/>
+          </a:fontRef>
+        </p:style>
+        <p:txBody>
+          <a:bodyPr rtlCol="0" anchor="ctr"/>
+          <a:lstStyle/>
+          <a:p>
+            <a:pPr algn="ctr"/>
+            <a:endParaRPr lang="en-US" dirty="0"/>
+          </a:p>
+        </p:txBody>
+      </p:sp>
+      <p:sp>
+        <p:nvSpPr>
           <p:cNvPr id="4" name="TextBox 3"/>
           <p:cNvSpPr txBox="1"/>
           <p:nvPr/>
         </p:nvSpPr>
         <p:spPr>
           <a:xfrm>
-            <a:off x="1337523" y="-11331"/>
-            <a:ext cx="5384801" cy="646331"/>
+            <a:off x="1864103" y="97524"/>
+            <a:ext cx="3197539" cy="584776"/>
           </a:xfrm>
           <a:prstGeom prst="rect">
             <a:avLst/>
@@ -3559,9 +3606,8 @@
           </a:bodyPr>
           <a:lstStyle/>
           <a:p>
-            <a:pPr algn="r"/>
-            <a:r>
-              <a:rPr lang="en-US" sz="3600" b="1" dirty="0" smtClean="0">
+            <a:r>
+              <a:rPr lang="en-US" sz="3200" b="1" dirty="0" smtClean="0">
                 <a:solidFill>
                   <a:schemeClr val="accent4">
                     <a:lumMod val="75000"/>
@@ -3573,7 +3619,7 @@
               <a:t>karynn </a:t>
             </a:r>
             <a:r>
-              <a:rPr lang="en-US" sz="3600" dirty="0" smtClean="0">
+              <a:rPr lang="en-US" sz="3200" dirty="0" smtClean="0">
                 <a:solidFill>
                   <a:schemeClr val="accent4">
                     <a:lumMod val="75000"/>
@@ -3584,7 +3630,7 @@
               </a:rPr>
               <a:t>elio tran</a:t>
             </a:r>
-            <a:endParaRPr lang="en-US" sz="3600" dirty="0">
+            <a:endParaRPr lang="en-US" sz="3200" dirty="0">
               <a:solidFill>
                 <a:schemeClr val="accent4">
                   <a:lumMod val="75000"/>
@@ -3596,167 +3642,16 @@
           </a:p>
         </p:txBody>
       </p:sp>
-      <p:grpSp>
-        <p:nvGrpSpPr>
-          <p:cNvPr id="54" name="Group 53"/>
-          <p:cNvGrpSpPr/>
-          <p:nvPr/>
-        </p:nvGrpSpPr>
-        <p:grpSpPr>
-          <a:xfrm>
-            <a:off x="2977096" y="550402"/>
-            <a:ext cx="2519407" cy="267818"/>
-            <a:chOff x="1937138" y="339629"/>
-            <a:chExt cx="2519407" cy="267818"/>
-          </a:xfrm>
-        </p:grpSpPr>
-        <p:grpSp>
-          <p:nvGrpSpPr>
-            <p:cNvPr id="12" name="Group 11"/>
-            <p:cNvGrpSpPr/>
-            <p:nvPr/>
-          </p:nvGrpSpPr>
-          <p:grpSpPr>
-            <a:xfrm>
-              <a:off x="1937138" y="353531"/>
-              <a:ext cx="209035" cy="253916"/>
-              <a:chOff x="3194627" y="202333"/>
-              <a:chExt cx="376382" cy="457194"/>
-            </a:xfrm>
-          </p:grpSpPr>
-          <p:sp>
-            <p:nvSpPr>
-              <p:cNvPr id="13" name="Oval 12"/>
-              <p:cNvSpPr/>
-              <p:nvPr/>
-            </p:nvSpPr>
-            <p:spPr>
-              <a:xfrm>
-                <a:off x="3194627" y="244766"/>
-                <a:ext cx="376382" cy="376382"/>
-              </a:xfrm>
-              <a:prstGeom prst="ellipse">
-                <a:avLst/>
-              </a:prstGeom>
-              <a:solidFill>
-                <a:schemeClr val="bg1">
-                  <a:lumMod val="50000"/>
-                </a:schemeClr>
-              </a:solidFill>
-              <a:ln>
-                <a:noFill/>
-              </a:ln>
-              <a:effectLst/>
-            </p:spPr>
-            <p:style>
-              <a:lnRef idx="1">
-                <a:schemeClr val="accent1"/>
-              </a:lnRef>
-              <a:fillRef idx="3">
-                <a:schemeClr val="accent1"/>
-              </a:fillRef>
-              <a:effectRef idx="2">
-                <a:schemeClr val="accent1"/>
-              </a:effectRef>
-              <a:fontRef idx="minor">
-                <a:schemeClr val="lt1"/>
-              </a:fontRef>
-            </p:style>
-            <p:txBody>
-              <a:bodyPr rtlCol="0" anchor="ctr"/>
-              <a:lstStyle/>
-              <a:p>
-                <a:pPr algn="ctr"/>
-                <a:endParaRPr lang="en-US" sz="1050" dirty="0">
-                  <a:latin typeface="Caviar Dreams"/>
-                  <a:cs typeface="Caviar Dreams"/>
-                </a:endParaRPr>
-              </a:p>
-            </p:txBody>
-          </p:sp>
-          <p:sp>
-            <p:nvSpPr>
-              <p:cNvPr id="14" name="TextBox 13"/>
-              <p:cNvSpPr txBox="1"/>
-              <p:nvPr/>
-            </p:nvSpPr>
-            <p:spPr>
-              <a:xfrm>
-                <a:off x="3207750" y="202333"/>
-                <a:ext cx="288637" cy="457194"/>
-              </a:xfrm>
-              <a:prstGeom prst="rect">
-                <a:avLst/>
-              </a:prstGeom>
-              <a:noFill/>
-            </p:spPr>
-            <p:txBody>
-              <a:bodyPr wrap="square" rtlCol="0">
-                <a:spAutoFit/>
-              </a:bodyPr>
-              <a:lstStyle/>
-              <a:p>
-                <a:r>
-                  <a:rPr lang="en-US" sz="1050" b="1" dirty="0">
-                    <a:solidFill>
-                      <a:schemeClr val="bg1"/>
-                    </a:solidFill>
-                    <a:latin typeface="Caviar Dreams"/>
-                    <a:cs typeface="Caviar Dreams"/>
-                  </a:rPr>
-                  <a:t>l</a:t>
-                </a:r>
-              </a:p>
-            </p:txBody>
-          </p:sp>
-        </p:grpSp>
-        <p:sp>
-          <p:nvSpPr>
-            <p:cNvPr id="18" name="TextBox 17"/>
-            <p:cNvSpPr txBox="1"/>
-            <p:nvPr/>
-          </p:nvSpPr>
-          <p:spPr>
-            <a:xfrm>
-              <a:off x="2090120" y="339629"/>
-              <a:ext cx="2366425" cy="246221"/>
-            </a:xfrm>
-            <a:prstGeom prst="rect">
-              <a:avLst/>
-            </a:prstGeom>
-            <a:noFill/>
-          </p:spPr>
-          <p:txBody>
-            <a:bodyPr wrap="square" rtlCol="0">
-              <a:spAutoFit/>
-            </a:bodyPr>
-            <a:lstStyle/>
-            <a:p>
-              <a:r>
-                <a:rPr lang="en-US" sz="1000" dirty="0" smtClean="0">
-                  <a:latin typeface="Caviar Dreams"/>
-                  <a:cs typeface="Caviar Dreams"/>
-                </a:rPr>
-                <a:t>linkedin.com/in/karynneliotran</a:t>
-              </a:r>
-              <a:endParaRPr lang="en-US" sz="1000" dirty="0">
-                <a:latin typeface="Caviar Dreams"/>
-                <a:cs typeface="Caviar Dreams"/>
-              </a:endParaRPr>
-            </a:p>
-          </p:txBody>
-        </p:sp>
-      </p:grpSp>
-      <p:sp>
-        <p:nvSpPr>
-          <p:cNvPr id="20" name="TextBox 19"/>
+      <p:sp>
+        <p:nvSpPr>
+          <p:cNvPr id="21" name="TextBox 20"/>
           <p:cNvSpPr txBox="1"/>
           <p:nvPr/>
         </p:nvSpPr>
         <p:spPr>
           <a:xfrm>
-            <a:off x="5216904" y="533468"/>
-            <a:ext cx="1674949" cy="246221"/>
+            <a:off x="1061999" y="634524"/>
+            <a:ext cx="4729177" cy="400110"/>
           </a:xfrm>
           <a:prstGeom prst="rect">
             <a:avLst/>
@@ -3770,163 +3665,83 @@
           <a:lstStyle/>
           <a:p>
             <a:r>
-              <a:rPr lang="en-US" sz="1000" dirty="0" smtClean="0">
+              <a:rPr lang="en-US" sz="1000" dirty="0">
+                <a:solidFill>
+                  <a:srgbClr val="7F7F7F"/>
+                </a:solidFill>
+                <a:latin typeface="Caviar Dreams"/>
+                <a:cs typeface="Caviar Dreams"/>
+              </a:rPr>
+              <a:t>k</a:t>
+            </a:r>
+            <a:r>
+              <a:rPr lang="en-US" sz="1000" dirty="0" smtClean="0">
+                <a:solidFill>
+                  <a:srgbClr val="7F7F7F"/>
+                </a:solidFill>
+                <a:latin typeface="Caviar Dreams"/>
+                <a:cs typeface="Caviar Dreams"/>
+              </a:rPr>
+              <a:t>arynn.tran@gmail.com </a:t>
+            </a:r>
+            <a:r>
+              <a:rPr lang="en-US" sz="1000" dirty="0">
+                <a:solidFill>
+                  <a:srgbClr val="7F7F7F"/>
+                </a:solidFill>
+                <a:latin typeface="Caviar Dreams"/>
+                <a:cs typeface="Caviar Dreams"/>
+              </a:rPr>
+              <a:t>| linkedin.com/in/</a:t>
+            </a:r>
+            <a:r>
+              <a:rPr lang="en-US" sz="1000" dirty="0" smtClean="0">
+                <a:solidFill>
+                  <a:srgbClr val="7F7F7F"/>
+                </a:solidFill>
+                <a:latin typeface="Caviar Dreams"/>
+                <a:cs typeface="Caviar Dreams"/>
+              </a:rPr>
+              <a:t>karynneliotran</a:t>
+            </a:r>
+            <a:r>
+              <a:rPr lang="en-US" sz="1000" dirty="0">
+                <a:solidFill>
+                  <a:srgbClr val="7F7F7F"/>
+                </a:solidFill>
+                <a:latin typeface="Caviar Dreams"/>
+                <a:cs typeface="Caviar Dreams"/>
+              </a:rPr>
+              <a:t> </a:t>
+            </a:r>
+            <a:r>
+              <a:rPr lang="en-US" sz="1000" dirty="0" smtClean="0">
+                <a:solidFill>
+                  <a:srgbClr val="7F7F7F"/>
+                </a:solidFill>
+                <a:latin typeface="Caviar Dreams"/>
+                <a:cs typeface="Caviar Dreams"/>
+              </a:rPr>
+              <a:t>| </a:t>
+            </a:r>
+            <a:r>
+              <a:rPr lang="en-US" sz="1000" dirty="0">
+                <a:solidFill>
+                  <a:schemeClr val="bg1">
+                    <a:lumMod val="50000"/>
+                  </a:schemeClr>
+                </a:solidFill>
                 <a:latin typeface="Caviar Dreams"/>
                 <a:cs typeface="Caviar Dreams"/>
               </a:rPr>
               <a:t>www.karynneliotran.com</a:t>
             </a:r>
+          </a:p>
+          <a:p>
             <a:endParaRPr lang="en-US" sz="1000" dirty="0">
-              <a:latin typeface="Caviar Dreams"/>
-              <a:cs typeface="Caviar Dreams"/>
-            </a:endParaRPr>
-          </a:p>
-        </p:txBody>
-      </p:sp>
-      <p:grpSp>
-        <p:nvGrpSpPr>
-          <p:cNvPr id="9" name="Group 8"/>
-          <p:cNvGrpSpPr/>
-          <p:nvPr/>
-        </p:nvGrpSpPr>
-        <p:grpSpPr>
-          <a:xfrm>
-            <a:off x="1287352" y="550402"/>
-            <a:ext cx="216543" cy="253916"/>
-            <a:chOff x="3181110" y="177579"/>
-            <a:chExt cx="389899" cy="457194"/>
-          </a:xfrm>
-        </p:grpSpPr>
-        <p:sp>
-          <p:nvSpPr>
-            <p:cNvPr id="10" name="Oval 9"/>
-            <p:cNvSpPr/>
-            <p:nvPr/>
-          </p:nvSpPr>
-          <p:spPr>
-            <a:xfrm>
-              <a:off x="3194627" y="244766"/>
-              <a:ext cx="376382" cy="376382"/>
-            </a:xfrm>
-            <a:prstGeom prst="ellipse">
-              <a:avLst/>
-            </a:prstGeom>
-            <a:solidFill>
-              <a:schemeClr val="bg1">
-                <a:lumMod val="50000"/>
-              </a:schemeClr>
-            </a:solidFill>
-            <a:ln>
-              <a:noFill/>
-            </a:ln>
-            <a:effectLst/>
-          </p:spPr>
-          <p:style>
-            <a:lnRef idx="1">
-              <a:schemeClr val="accent1"/>
-            </a:lnRef>
-            <a:fillRef idx="3">
-              <a:schemeClr val="accent1"/>
-            </a:fillRef>
-            <a:effectRef idx="2">
-              <a:schemeClr val="accent1"/>
-            </a:effectRef>
-            <a:fontRef idx="minor">
-              <a:schemeClr val="lt1"/>
-            </a:fontRef>
-          </p:style>
-          <p:txBody>
-            <a:bodyPr rtlCol="0" anchor="ctr"/>
-            <a:lstStyle/>
-            <a:p>
-              <a:pPr algn="ctr"/>
-              <a:endParaRPr lang="en-US" sz="1050" dirty="0">
-                <a:latin typeface="Caviar Dreams"/>
-                <a:cs typeface="Caviar Dreams"/>
-              </a:endParaRPr>
-            </a:p>
-          </p:txBody>
-        </p:sp>
-        <p:sp>
-          <p:nvSpPr>
-            <p:cNvPr id="11" name="TextBox 10"/>
-            <p:cNvSpPr txBox="1"/>
-            <p:nvPr/>
-          </p:nvSpPr>
-          <p:spPr>
-            <a:xfrm>
-              <a:off x="3181110" y="177579"/>
-              <a:ext cx="288637" cy="457194"/>
-            </a:xfrm>
-            <a:prstGeom prst="rect">
-              <a:avLst/>
-            </a:prstGeom>
-            <a:noFill/>
-          </p:spPr>
-          <p:txBody>
-            <a:bodyPr wrap="square" rtlCol="0">
-              <a:spAutoFit/>
-            </a:bodyPr>
-            <a:lstStyle/>
-            <a:p>
-              <a:r>
-                <a:rPr lang="en-US" sz="1050" b="1" dirty="0" smtClean="0">
-                  <a:solidFill>
-                    <a:schemeClr val="bg1"/>
-                  </a:solidFill>
-                  <a:latin typeface="Caviar Dreams"/>
-                  <a:cs typeface="Caviar Dreams"/>
-                </a:rPr>
-                <a:t>e</a:t>
-              </a:r>
-              <a:endParaRPr lang="en-US" sz="1050" b="1" dirty="0">
-                <a:solidFill>
-                  <a:schemeClr val="bg1"/>
-                </a:solidFill>
-                <a:latin typeface="Caviar Dreams"/>
-                <a:cs typeface="Caviar Dreams"/>
-              </a:endParaRPr>
-            </a:p>
-          </p:txBody>
-        </p:sp>
-      </p:grpSp>
-      <p:sp>
-        <p:nvSpPr>
-          <p:cNvPr id="21" name="TextBox 20"/>
-          <p:cNvSpPr txBox="1"/>
-          <p:nvPr/>
-        </p:nvSpPr>
-        <p:spPr>
-          <a:xfrm>
-            <a:off x="1454192" y="556406"/>
-            <a:ext cx="2165638" cy="246221"/>
-          </a:xfrm>
-          <a:prstGeom prst="rect">
-            <a:avLst/>
-          </a:prstGeom>
-          <a:noFill/>
-        </p:spPr>
-        <p:txBody>
-          <a:bodyPr wrap="square" rtlCol="0">
-            <a:spAutoFit/>
-          </a:bodyPr>
-          <a:lstStyle/>
-          <a:p>
-            <a:r>
-              <a:rPr lang="en-US" sz="1000" dirty="0">
-                <a:latin typeface="Caviar Dreams"/>
-                <a:cs typeface="Caviar Dreams"/>
-              </a:rPr>
-              <a:t>k</a:t>
-            </a:r>
-            <a:r>
-              <a:rPr lang="en-US" sz="1000" dirty="0" smtClean="0">
-                <a:latin typeface="Caviar Dreams"/>
-                <a:cs typeface="Caviar Dreams"/>
-              </a:rPr>
-              <a:t>arynn.tran@gmail.com</a:t>
-            </a:r>
-            <a:endParaRPr lang="en-US" sz="1000" dirty="0">
+              <a:solidFill>
+                <a:srgbClr val="7F7F7F"/>
+              </a:solidFill>
               <a:latin typeface="Caviar Dreams"/>
               <a:cs typeface="Caviar Dreams"/>
             </a:endParaRPr>
@@ -3940,8 +3755,8 @@
           <p:nvPr/>
         </p:nvGrpSpPr>
         <p:grpSpPr>
-          <a:xfrm>
-            <a:off x="5341621" y="917278"/>
+          <a:xfrm rot="16200000">
+            <a:off x="-232364" y="2255823"/>
             <a:ext cx="1159732" cy="264980"/>
             <a:chOff x="5453299" y="1206615"/>
             <a:chExt cx="1159732" cy="264980"/>
@@ -4043,7 +3858,7 @@
         </p:nvSpPr>
         <p:spPr>
           <a:xfrm>
-            <a:off x="949778" y="1307286"/>
+            <a:off x="498229" y="3447518"/>
             <a:ext cx="1468111" cy="707886"/>
           </a:xfrm>
           <a:prstGeom prst="rect">
@@ -4107,8 +3922,8 @@
         </p:nvSpPr>
         <p:spPr>
           <a:xfrm>
-            <a:off x="2417890" y="2204788"/>
-            <a:ext cx="4304434" cy="1631216"/>
+            <a:off x="1966341" y="3447518"/>
+            <a:ext cx="4755983" cy="707886"/>
           </a:xfrm>
           <a:prstGeom prst="rect">
             <a:avLst/>
@@ -4126,39 +3941,25 @@
               <a:buChar char="•"/>
             </a:pPr>
             <a:r>
-              <a:rPr lang="en-US" sz="1000" dirty="0">
-                <a:latin typeface="Caviar Dreams"/>
-                <a:cs typeface="Caviar Dreams"/>
-              </a:rPr>
-              <a:t>Developed a restaurant management app, primarily implementing Ruby, </a:t>
-            </a:r>
-            <a:r>
-              <a:rPr lang="en-US" sz="1000" dirty="0" err="1">
-                <a:latin typeface="Caviar Dreams"/>
-                <a:cs typeface="Caviar Dreams"/>
-              </a:rPr>
-              <a:t>ActiveRecord</a:t>
-            </a:r>
-            <a:r>
-              <a:rPr lang="en-US" sz="1000" dirty="0">
-                <a:latin typeface="Caviar Dreams"/>
-                <a:cs typeface="Caviar Dreams"/>
-              </a:rPr>
-              <a:t>, and </a:t>
-            </a:r>
-            <a:r>
-              <a:rPr lang="en-US" sz="1000" dirty="0" err="1">
-                <a:latin typeface="Caviar Dreams"/>
-                <a:cs typeface="Caviar Dreams"/>
-              </a:rPr>
-              <a:t>PostgreSQL</a:t>
-            </a:r>
-            <a:r>
-              <a:rPr lang="en-US" sz="1000" dirty="0">
-                <a:latin typeface="Caviar Dreams"/>
-                <a:cs typeface="Caviar Dreams"/>
-              </a:rPr>
-              <a:t> on a Sinatra framework</a:t>
+              <a:rPr lang="en-US" sz="1000" dirty="0" smtClean="0">
+                <a:latin typeface="Caviar Dreams"/>
+                <a:cs typeface="Caviar Dreams"/>
+              </a:rPr>
+              <a:t>Completed an intensive web development immersive program, resulting in over 800 hours of class, </a:t>
+            </a:r>
+            <a:r>
+              <a:rPr lang="en-US" sz="1000" dirty="0" smtClean="0">
+                <a:latin typeface="Caviar Dreams"/>
+                <a:cs typeface="Caviar Dreams"/>
+              </a:rPr>
+              <a:t>labwork</a:t>
+            </a:r>
+            <a:r>
+              <a:rPr lang="en-US" sz="1000" dirty="0" smtClean="0">
+                <a:latin typeface="Caviar Dreams"/>
+                <a:cs typeface="Caviar Dreams"/>
+              </a:rPr>
+              <a:t> and presentations in twelve weeks </a:t>
             </a:r>
           </a:p>
           <a:p>
@@ -4167,104 +3968,11 @@
               <a:buChar char="•"/>
             </a:pPr>
             <a:r>
-              <a:rPr lang="en-US" sz="1000" dirty="0">
-                <a:latin typeface="Caviar Dreams"/>
-                <a:cs typeface="Caviar Dreams"/>
-              </a:rPr>
-              <a:t>Created a children’s hangman-style game with a focus on </a:t>
-            </a:r>
-            <a:r>
-              <a:rPr lang="en-US" sz="1000" dirty="0" err="1">
-                <a:latin typeface="Caviar Dreams"/>
-                <a:cs typeface="Caviar Dreams"/>
-              </a:rPr>
-              <a:t>Javascript</a:t>
-            </a:r>
-            <a:r>
-              <a:rPr lang="en-US" sz="1000" dirty="0">
-                <a:latin typeface="Caviar Dreams"/>
-                <a:cs typeface="Caviar Dreams"/>
-              </a:rPr>
-              <a:t>, </a:t>
-            </a:r>
-            <a:r>
-              <a:rPr lang="en-US" sz="1000" dirty="0" err="1">
-                <a:latin typeface="Caviar Dreams"/>
-                <a:cs typeface="Caviar Dreams"/>
-              </a:rPr>
-              <a:t>JQuery</a:t>
-            </a:r>
-            <a:r>
-              <a:rPr lang="en-US" sz="1000" dirty="0">
-                <a:latin typeface="Caviar Dreams"/>
-                <a:cs typeface="Caviar Dreams"/>
-              </a:rPr>
-              <a:t> and AJAX</a:t>
-            </a:r>
-          </a:p>
-          <a:p>
-            <a:pPr marL="171450" indent="-171450">
-              <a:buFont typeface="Arial"/>
-              <a:buChar char="•"/>
-            </a:pPr>
-            <a:r>
-              <a:rPr lang="en-US" sz="1000" dirty="0">
-                <a:latin typeface="Caviar Dreams"/>
-                <a:cs typeface="Caviar Dreams"/>
-              </a:rPr>
-              <a:t>Collaborated effectively with team members to create a travel snapshot app of a location’s weather, average flight prices, and </a:t>
-            </a:r>
-            <a:r>
-              <a:rPr lang="en-US" sz="1000" dirty="0" err="1">
-                <a:latin typeface="Caviar Dreams"/>
-                <a:cs typeface="Caviar Dreams"/>
-              </a:rPr>
-              <a:t>geotagged</a:t>
-            </a:r>
-            <a:r>
-              <a:rPr lang="en-US" sz="1000" dirty="0">
-                <a:latin typeface="Caviar Dreams"/>
-                <a:cs typeface="Caviar Dreams"/>
-              </a:rPr>
-              <a:t> photos, utilizing multiple APIs, Rails, </a:t>
-            </a:r>
-            <a:r>
-              <a:rPr lang="en-US" sz="1000" dirty="0" err="1">
-                <a:latin typeface="Caviar Dreams"/>
-                <a:cs typeface="Caviar Dreams"/>
-              </a:rPr>
-              <a:t>PostgreSQL</a:t>
-            </a:r>
-            <a:r>
-              <a:rPr lang="en-US" sz="1000" dirty="0">
-                <a:latin typeface="Caviar Dreams"/>
-                <a:cs typeface="Caviar Dreams"/>
-              </a:rPr>
-              <a:t> and </a:t>
-            </a:r>
-            <a:r>
-              <a:rPr lang="en-US" sz="1000" dirty="0" err="1" smtClean="0">
-                <a:latin typeface="Caviar Dreams"/>
-                <a:cs typeface="Caviar Dreams"/>
-              </a:rPr>
-              <a:t>Javascript</a:t>
-            </a:r>
-            <a:endParaRPr lang="en-US" sz="1000" dirty="0" smtClean="0">
-              <a:latin typeface="Caviar Dreams"/>
-              <a:cs typeface="Caviar Dreams"/>
-            </a:endParaRPr>
-          </a:p>
-          <a:p>
-            <a:pPr marL="171450" indent="-171450">
-              <a:buFont typeface="Arial"/>
-              <a:buChar char="•"/>
-            </a:pPr>
-            <a:r>
-              <a:rPr lang="en-US" sz="1000" dirty="0" smtClean="0">
-                <a:latin typeface="Caviar Dreams"/>
-                <a:cs typeface="Caviar Dreams"/>
-              </a:rPr>
-              <a:t>Developed an interactive comic book story-generator app, built with Ruby on Rails, Javascript, Backbone.js, Underscore.js, AJAX</a:t>
+              <a:rPr lang="en-US" sz="1000" dirty="0" smtClean="0">
+                <a:latin typeface="Caviar Dreams"/>
+                <a:cs typeface="Caviar Dreams"/>
+              </a:rPr>
+              <a:t>Developed four web applications using a variety of languages, libraries, frameworks, databases and third party APIs</a:t>
             </a:r>
           </a:p>
         </p:txBody>
@@ -4277,8 +3985,8 @@
         </p:nvSpPr>
         <p:spPr>
           <a:xfrm>
-            <a:off x="689251" y="3981854"/>
-            <a:ext cx="1728638" cy="1815882"/>
+            <a:off x="237702" y="4345239"/>
+            <a:ext cx="1728638" cy="1323439"/>
           </a:xfrm>
           <a:prstGeom prst="rect">
             <a:avLst/>
@@ -4345,27 +4053,6 @@
             </a:endParaRPr>
           </a:p>
           <a:p>
-            <a:pPr marL="0" lvl="1" algn="r"/>
-            <a:r>
-              <a:rPr lang="en-US" sz="800" i="1" dirty="0">
-                <a:latin typeface="Caviar Dreams"/>
-                <a:cs typeface="Caviar Dreams"/>
-              </a:rPr>
-              <a:t>Key Clients: Proprietary global financial services client, Meredith, Allstate, Hilton, Reebok, PepsiCo, Heinz </a:t>
-            </a:r>
-            <a:r>
-              <a:rPr lang="en-US" sz="800" i="1" dirty="0" smtClean="0">
-                <a:latin typeface="Caviar Dreams"/>
-                <a:cs typeface="Caviar Dreams"/>
-              </a:rPr>
-              <a:t>and Hallmark</a:t>
-            </a:r>
-            <a:endParaRPr lang="en-US" sz="800" i="1" dirty="0">
-              <a:latin typeface="Caviar Dreams"/>
-              <a:cs typeface="Caviar Dreams"/>
-            </a:endParaRPr>
-          </a:p>
-          <a:p>
             <a:pPr algn="r"/>
             <a:endParaRPr lang="en-US" sz="1000" dirty="0">
               <a:latin typeface="Caviar Dreams"/>
@@ -4382,8 +4069,8 @@
         </p:nvSpPr>
         <p:spPr>
           <a:xfrm>
-            <a:off x="2417889" y="3956453"/>
-            <a:ext cx="4203255" cy="2554545"/>
+            <a:off x="1976955" y="4345239"/>
+            <a:ext cx="4644190" cy="1846659"/>
           </a:xfrm>
           <a:prstGeom prst="rect">
             <a:avLst/>
@@ -4401,51 +4088,40 @@
               <a:buChar char="•"/>
             </a:pPr>
             <a:r>
+              <a:rPr lang="en-US" sz="1000" dirty="0" smtClean="0">
+                <a:latin typeface="Caviar Dreams"/>
+                <a:cs typeface="Caviar Dreams"/>
+              </a:rPr>
+              <a:t>Built the foundation of the New </a:t>
+            </a:r>
+            <a:r>
               <a:rPr lang="en-US" sz="1000" dirty="0">
                 <a:latin typeface="Caviar Dreams"/>
                 <a:cs typeface="Caviar Dreams"/>
               </a:rPr>
-              <a:t>Spearheaded a 3 </a:t>
-            </a:r>
-            <a:r>
-              <a:rPr lang="en-US" sz="1000" dirty="0" smtClean="0">
-                <a:latin typeface="Caviar Dreams"/>
-                <a:cs typeface="Caviar Dreams"/>
-              </a:rPr>
-              <a:t>month-long </a:t>
+              <a:t>York </a:t>
+            </a:r>
+            <a:r>
+              <a:rPr lang="en-US" sz="1000" dirty="0" smtClean="0">
+                <a:latin typeface="Caviar Dreams"/>
+                <a:cs typeface="Caviar Dreams"/>
+              </a:rPr>
+              <a:t>regional office with 7 Boston-based pioneers, creating internal </a:t>
             </a:r>
             <a:r>
               <a:rPr lang="en-US" sz="1000" dirty="0">
                 <a:latin typeface="Caviar Dreams"/>
                 <a:cs typeface="Caviar Dreams"/>
               </a:rPr>
-              <a:t>innovation project for a global financial services </a:t>
-            </a:r>
-            <a:r>
-              <a:rPr lang="en-US" sz="1000" dirty="0" smtClean="0">
-                <a:latin typeface="Caviar Dreams"/>
-                <a:cs typeface="Caviar Dreams"/>
-              </a:rPr>
-              <a:t>account, leading key clients and </a:t>
-            </a:r>
-            <a:r>
-              <a:rPr lang="en-US" sz="1000" dirty="0">
-                <a:latin typeface="Caviar Dreams"/>
-                <a:cs typeface="Caviar Dreams"/>
-              </a:rPr>
-              <a:t>target consumers </a:t>
-            </a:r>
-            <a:r>
-              <a:rPr lang="en-US" sz="1000" dirty="0" smtClean="0">
-                <a:latin typeface="Caviar Dreams"/>
-                <a:cs typeface="Caviar Dreams"/>
-              </a:rPr>
-              <a:t>in co-creating 4 unique products with an intended rollout in 2015</a:t>
-            </a:r>
-            <a:endParaRPr lang="en-US" sz="1000" dirty="0">
-              <a:latin typeface="Caviar Dreams"/>
-              <a:cs typeface="Caviar Dreams"/>
-            </a:endParaRPr>
+              <a:t>company culture </a:t>
+            </a:r>
+            <a:r>
+              <a:rPr lang="en-US" sz="1000" dirty="0" smtClean="0">
+                <a:latin typeface="Caviar Dreams"/>
+                <a:cs typeface="Caviar Dreams"/>
+              </a:rPr>
+              <a:t>initiatives, interviewing new hires and providing mentorship to junior colleagues</a:t>
+            </a:r>
           </a:p>
           <a:p>
             <a:pPr marL="171450" indent="-171450">
@@ -4457,35 +4133,21 @@
                 <a:latin typeface="Caviar Dreams"/>
                 <a:cs typeface="Caviar Dreams"/>
               </a:rPr>
-              <a:t>Built the foundation of the New </a:t>
+              <a:t>Owned a lead storyteller role, analyzing data, designing and presenting reports of insights </a:t>
             </a:r>
             <a:r>
               <a:rPr lang="en-US" sz="1000" dirty="0">
                 <a:latin typeface="Caviar Dreams"/>
                 <a:cs typeface="Caviar Dreams"/>
               </a:rPr>
-              <a:t>York </a:t>
-            </a:r>
-            <a:r>
-              <a:rPr lang="en-US" sz="1000" dirty="0" smtClean="0">
-                <a:latin typeface="Caviar Dreams"/>
-                <a:cs typeface="Caviar Dreams"/>
-              </a:rPr>
-              <a:t>regional office with 7 Boston-based pioneers, creating internal </a:t>
-            </a:r>
-            <a:r>
-              <a:rPr lang="en-US" sz="1000" dirty="0">
-                <a:latin typeface="Caviar Dreams"/>
-                <a:cs typeface="Caviar Dreams"/>
-              </a:rPr>
-              <a:t>company culture </a:t>
-            </a:r>
-            <a:r>
-              <a:rPr lang="en-US" sz="1000" dirty="0" smtClean="0">
-                <a:latin typeface="Caviar Dreams"/>
-                <a:cs typeface="Caviar Dreams"/>
-              </a:rPr>
-              <a:t>initiatives, interviewing new hires and providing mentorship to junior colleagues</a:t>
+              <a:t>and strategic </a:t>
+            </a:r>
+            <a:r>
+              <a:rPr lang="en-US" sz="1000" dirty="0" smtClean="0">
+                <a:latin typeface="Caviar Dreams"/>
+                <a:cs typeface="Caviar Dreams"/>
+              </a:rPr>
+              <a:t>recommendations for C-level executives, agencies and other key stakeholders</a:t>
             </a:r>
           </a:p>
           <a:p>
@@ -4498,33 +4160,6 @@
                 <a:latin typeface="Caviar Dreams"/>
                 <a:cs typeface="Caviar Dreams"/>
               </a:rPr>
-              <a:t>Owned a lead storyteller role on multiple teams, analyzing data, designing and presenting reports of insights </a:t>
-            </a:r>
-            <a:r>
-              <a:rPr lang="en-US" sz="1000" dirty="0">
-                <a:latin typeface="Caviar Dreams"/>
-                <a:cs typeface="Caviar Dreams"/>
-              </a:rPr>
-              <a:t>and strategic </a:t>
-            </a:r>
-            <a:r>
-              <a:rPr lang="en-US" sz="1000" dirty="0" smtClean="0">
-                <a:latin typeface="Caviar Dreams"/>
-                <a:cs typeface="Caviar Dreams"/>
-              </a:rPr>
-              <a:t>recommendations for an audience of C-level executives, agencies and branding partners</a:t>
-            </a:r>
-          </a:p>
-          <a:p>
-            <a:pPr marL="171450" indent="-171450">
-              <a:buFont typeface="Arial"/>
-              <a:buChar char="•"/>
-            </a:pPr>
-            <a:r>
-              <a:rPr lang="en-US" sz="1000" dirty="0" smtClean="0">
-                <a:latin typeface="Caviar Dreams"/>
-                <a:cs typeface="Caviar Dreams"/>
-              </a:rPr>
               <a:t>Won the </a:t>
             </a:r>
             <a:r>
@@ -4543,14 +4178,28 @@
             </a:r>
           </a:p>
           <a:p>
-            <a:pPr marL="171450" indent="-171450">
-              <a:buFont typeface="Arial"/>
-              <a:buChar char="•"/>
-            </a:pPr>
-            <a:endParaRPr lang="en-US" sz="1000" i="1" dirty="0">
+            <a:pPr marL="0" lvl="1"/>
+            <a:endParaRPr lang="en-US" sz="800" i="1" dirty="0" smtClean="0">
               <a:latin typeface="Caviar Dreams"/>
               <a:cs typeface="Caviar Dreams"/>
             </a:endParaRPr>
+          </a:p>
+          <a:p>
+            <a:pPr marL="457200" lvl="2"/>
+            <a:r>
+              <a:rPr lang="en-US" sz="800" i="1" dirty="0" smtClean="0">
+                <a:latin typeface="Caviar Dreams"/>
+                <a:cs typeface="Caviar Dreams"/>
+              </a:rPr>
+              <a:t>Key </a:t>
+            </a:r>
+            <a:r>
+              <a:rPr lang="en-US" sz="800" i="1" dirty="0">
+                <a:latin typeface="Caviar Dreams"/>
+                <a:cs typeface="Caviar Dreams"/>
+              </a:rPr>
+              <a:t>Clients: Proprietary global financial services client, Meredith, Allstate, Hilton, Reebok, PepsiCo, Heinz and Hallmark</a:t>
+            </a:r>
           </a:p>
           <a:p>
             <a:pPr marL="171450" indent="-171450">
@@ -4572,7 +4221,7 @@
         </p:nvSpPr>
         <p:spPr>
           <a:xfrm>
-            <a:off x="303000" y="6313680"/>
+            <a:off x="-148549" y="6201802"/>
             <a:ext cx="2114889" cy="861774"/>
           </a:xfrm>
           <a:prstGeom prst="rect">
@@ -4612,16 +4261,12 @@
           <a:p>
             <a:pPr algn="r"/>
             <a:r>
-              <a:rPr lang="en-US" sz="1000" smtClean="0">
+              <a:rPr lang="en-US" sz="1000" dirty="0" smtClean="0">
                 <a:latin typeface="Caviar Dreams"/>
                 <a:cs typeface="Caviar Dreams"/>
               </a:rPr>
               <a:t>PUBLISHER</a:t>
             </a:r>
-            <a:endParaRPr lang="en-US" sz="1000" dirty="0" smtClean="0">
-              <a:latin typeface="Caviar Dreams"/>
-              <a:cs typeface="Caviar Dreams"/>
-            </a:endParaRPr>
           </a:p>
           <a:p>
             <a:pPr algn="r"/>
@@ -4654,8 +4299,8 @@
         </p:nvSpPr>
         <p:spPr>
           <a:xfrm>
-            <a:off x="2412366" y="6296746"/>
-            <a:ext cx="4136612" cy="1169551"/>
+            <a:off x="1978423" y="6184868"/>
+            <a:ext cx="4570556" cy="1015663"/>
           </a:xfrm>
           <a:prstGeom prst="rect">
             <a:avLst/>
@@ -4766,319 +4411,28 @@
       </p:sp>
       <p:grpSp>
         <p:nvGrpSpPr>
-          <p:cNvPr id="98" name="Group 97"/>
+          <p:cNvPr id="95" name="Group 94"/>
           <p:cNvGrpSpPr/>
           <p:nvPr/>
         </p:nvGrpSpPr>
         <p:grpSpPr>
-          <a:xfrm>
-            <a:off x="3375045" y="7551565"/>
-            <a:ext cx="3269736" cy="1453890"/>
-            <a:chOff x="1697203" y="7874453"/>
-            <a:chExt cx="2848059" cy="1453890"/>
+          <a:xfrm rot="5400000">
+            <a:off x="5900748" y="7204496"/>
+            <a:ext cx="304211" cy="1015222"/>
+            <a:chOff x="1691827" y="7739953"/>
+            <a:chExt cx="264979" cy="1015222"/>
           </a:xfrm>
         </p:grpSpPr>
-        <p:grpSp>
-          <p:nvGrpSpPr>
-            <p:cNvPr id="95" name="Group 94"/>
-            <p:cNvGrpSpPr/>
-            <p:nvPr/>
-          </p:nvGrpSpPr>
-          <p:grpSpPr>
-            <a:xfrm>
-              <a:off x="1698692" y="7934199"/>
-              <a:ext cx="264979" cy="1015222"/>
-              <a:chOff x="1691827" y="7739953"/>
-              <a:chExt cx="264979" cy="1015222"/>
-            </a:xfrm>
-          </p:grpSpPr>
-          <p:sp>
-            <p:nvSpPr>
-              <p:cNvPr id="85" name="Round Same Side Corner Rectangle 84"/>
-              <p:cNvSpPr/>
-              <p:nvPr/>
-            </p:nvSpPr>
-            <p:spPr>
-              <a:xfrm rot="5400000">
-                <a:off x="1345400" y="8086380"/>
-                <a:ext cx="957834" cy="264979"/>
-              </a:xfrm>
-              <a:prstGeom prst="round2SameRect">
-                <a:avLst/>
-              </a:prstGeom>
-              <a:solidFill>
-                <a:schemeClr val="bg1">
-                  <a:lumMod val="75000"/>
-                </a:schemeClr>
-              </a:solidFill>
-              <a:ln>
-                <a:noFill/>
-              </a:ln>
-              <a:effectLst/>
-            </p:spPr>
-            <p:style>
-              <a:lnRef idx="1">
-                <a:schemeClr val="accent1"/>
-              </a:lnRef>
-              <a:fillRef idx="3">
-                <a:schemeClr val="accent1"/>
-              </a:fillRef>
-              <a:effectRef idx="2">
-                <a:schemeClr val="accent1"/>
-              </a:effectRef>
-              <a:fontRef idx="minor">
-                <a:schemeClr val="lt1"/>
-              </a:fontRef>
-            </p:style>
-            <p:txBody>
-              <a:bodyPr rtlCol="0" anchor="ctr"/>
-              <a:lstStyle/>
-              <a:p>
-                <a:pPr algn="ctr"/>
-                <a:endParaRPr lang="en-US" dirty="0">
-                  <a:latin typeface="Caviar Dreams"/>
-                  <a:cs typeface="Caviar Dreams"/>
-                </a:endParaRPr>
-              </a:p>
-            </p:txBody>
-          </p:sp>
-          <p:sp>
-            <p:nvSpPr>
-              <p:cNvPr id="86" name="TextBox 85"/>
-              <p:cNvSpPr txBox="1"/>
-              <p:nvPr/>
-            </p:nvSpPr>
-            <p:spPr>
-              <a:xfrm rot="16200000">
-                <a:off x="1336222" y="8144771"/>
-                <a:ext cx="992936" cy="227872"/>
-              </a:xfrm>
-              <a:prstGeom prst="rect">
-                <a:avLst/>
-              </a:prstGeom>
-              <a:noFill/>
-            </p:spPr>
-            <p:txBody>
-              <a:bodyPr wrap="square" rtlCol="0">
-                <a:spAutoFit/>
-              </a:bodyPr>
-              <a:lstStyle/>
-              <a:p>
-                <a:pPr algn="r"/>
-                <a:r>
-                  <a:rPr lang="en-US" sz="1100" b="1" dirty="0" smtClean="0">
-                    <a:latin typeface="Caviar Dreams"/>
-                    <a:cs typeface="Caviar Dreams"/>
-                  </a:rPr>
-                  <a:t>EDUCATION</a:t>
-                </a:r>
-                <a:endParaRPr lang="en-US" sz="1100" b="1" dirty="0">
-                  <a:latin typeface="Caviar Dreams"/>
-                  <a:cs typeface="Caviar Dreams"/>
-                </a:endParaRPr>
-              </a:p>
-            </p:txBody>
-          </p:sp>
-        </p:grpSp>
         <p:sp>
           <p:nvSpPr>
-            <p:cNvPr id="87" name="TextBox 86"/>
-            <p:cNvSpPr txBox="1"/>
-            <p:nvPr/>
-          </p:nvSpPr>
-          <p:spPr>
-            <a:xfrm>
-              <a:off x="1805299" y="7936454"/>
-              <a:ext cx="2726764" cy="1323439"/>
-            </a:xfrm>
-            <a:prstGeom prst="rect">
-              <a:avLst/>
-            </a:prstGeom>
-            <a:noFill/>
-          </p:spPr>
-          <p:txBody>
-            <a:bodyPr wrap="square" rtlCol="0">
-              <a:spAutoFit/>
-            </a:bodyPr>
-            <a:lstStyle/>
-            <a:p>
-              <a:pPr algn="r"/>
-              <a:r>
-                <a:rPr lang="en-US" sz="1000" b="1" dirty="0" smtClean="0">
-                  <a:latin typeface="Caviar Dreams"/>
-                  <a:cs typeface="Caviar Dreams"/>
-                </a:rPr>
-                <a:t>GENERAL ASSEMBLY</a:t>
-              </a:r>
-            </a:p>
-            <a:p>
-              <a:pPr algn="r"/>
-              <a:r>
-                <a:rPr lang="en-US" sz="1000" dirty="0" smtClean="0">
-                  <a:latin typeface="Caviar Dreams"/>
-                  <a:cs typeface="Caviar Dreams"/>
-                </a:rPr>
-                <a:t>WEB DEVELOPMENT IMMERSIVE</a:t>
-              </a:r>
-            </a:p>
-            <a:p>
-              <a:pPr algn="r"/>
-              <a:r>
-                <a:rPr lang="en-US" sz="1000" dirty="0" smtClean="0">
-                  <a:latin typeface="Caviar Dreams"/>
-                  <a:cs typeface="Caviar Dreams"/>
-                </a:rPr>
-                <a:t>Graduate of the September 2014 Cohort</a:t>
-              </a:r>
-            </a:p>
-            <a:p>
-              <a:pPr algn="r"/>
-              <a:endParaRPr lang="en-US" sz="1000" b="1" dirty="0" smtClean="0">
-                <a:latin typeface="Caviar Dreams"/>
-                <a:cs typeface="Caviar Dreams"/>
-              </a:endParaRPr>
-            </a:p>
-            <a:p>
-              <a:pPr algn="r"/>
-              <a:r>
-                <a:rPr lang="en-US" sz="1000" b="1" dirty="0" smtClean="0">
-                  <a:latin typeface="Caviar Dreams"/>
-                  <a:cs typeface="Caviar Dreams"/>
-                </a:rPr>
-                <a:t>BOSTON UNIVERSITY 2007</a:t>
-              </a:r>
-            </a:p>
-            <a:p>
-              <a:pPr algn="r"/>
-              <a:r>
-                <a:rPr lang="en-US" sz="1000" dirty="0" smtClean="0">
-                  <a:latin typeface="Caviar Dreams"/>
-                  <a:cs typeface="Caviar Dreams"/>
-                </a:rPr>
-                <a:t>Bachelor of Science, </a:t>
-              </a:r>
-              <a:r>
-                <a:rPr lang="en-US" sz="1000" i="1" dirty="0" smtClean="0">
-                  <a:latin typeface="Caviar Dreams"/>
-                  <a:cs typeface="Caviar Dreams"/>
-                </a:rPr>
-                <a:t>School of Communication</a:t>
-              </a:r>
-            </a:p>
-            <a:p>
-              <a:pPr algn="r"/>
-              <a:r>
-                <a:rPr lang="en-US" sz="1000" dirty="0" smtClean="0">
-                  <a:latin typeface="Caviar Dreams"/>
-                  <a:cs typeface="Caviar Dreams"/>
-                </a:rPr>
-                <a:t>Minor, </a:t>
-              </a:r>
-              <a:r>
-                <a:rPr lang="en-US" sz="1000" i="1" dirty="0" smtClean="0">
-                  <a:latin typeface="Caviar Dreams"/>
-                  <a:cs typeface="Caviar Dreams"/>
-                </a:rPr>
-                <a:t>School of Management</a:t>
-              </a:r>
-            </a:p>
-            <a:p>
-              <a:pPr algn="r"/>
-              <a:r>
-                <a:rPr lang="en-US" sz="1000" dirty="0" smtClean="0">
-                  <a:latin typeface="Caviar Dreams"/>
-                  <a:cs typeface="Caviar Dreams"/>
-                </a:rPr>
-                <a:t>Concentration, Psychology, </a:t>
-              </a:r>
-              <a:r>
-                <a:rPr lang="en-US" sz="1000" i="1" dirty="0" smtClean="0">
-                  <a:latin typeface="Caviar Dreams"/>
-                  <a:cs typeface="Caviar Dreams"/>
-                </a:rPr>
-                <a:t>School of Liberal Arts</a:t>
-              </a:r>
-              <a:endParaRPr lang="en-US" sz="1000" i="1" dirty="0">
-                <a:latin typeface="Caviar Dreams"/>
-                <a:cs typeface="Caviar Dreams"/>
-              </a:endParaRPr>
-            </a:p>
-          </p:txBody>
-        </p:sp>
-        <p:sp>
-          <p:nvSpPr>
-            <p:cNvPr id="83" name="Rectangle 82"/>
+            <p:cNvPr id="85" name="Round Same Side Corner Rectangle 84"/>
             <p:cNvSpPr/>
             <p:nvPr/>
           </p:nvSpPr>
           <p:spPr>
-            <a:xfrm>
-              <a:off x="1697203" y="7874453"/>
-              <a:ext cx="2848059" cy="1453890"/>
-            </a:xfrm>
-            <a:prstGeom prst="rect">
-              <a:avLst/>
-            </a:prstGeom>
-            <a:noFill/>
-            <a:ln w="6350">
-              <a:solidFill>
-                <a:schemeClr val="tx1"/>
-              </a:solidFill>
-              <a:prstDash val="solid"/>
-            </a:ln>
-            <a:effectLst/>
-          </p:spPr>
-          <p:style>
-            <a:lnRef idx="1">
-              <a:schemeClr val="accent1"/>
-            </a:lnRef>
-            <a:fillRef idx="3">
-              <a:schemeClr val="accent1"/>
-            </a:fillRef>
-            <a:effectRef idx="2">
-              <a:schemeClr val="accent1"/>
-            </a:effectRef>
-            <a:fontRef idx="minor">
-              <a:schemeClr val="lt1"/>
-            </a:fontRef>
-          </p:style>
-          <p:txBody>
-            <a:bodyPr rtlCol="0" anchor="ctr"/>
-            <a:lstStyle/>
-            <a:p>
-              <a:pPr algn="ctr"/>
-              <a:endParaRPr lang="en-US" dirty="0">
-                <a:latin typeface="Caviar Dreams"/>
-                <a:cs typeface="Caviar Dreams"/>
-              </a:endParaRPr>
-            </a:p>
-          </p:txBody>
-        </p:sp>
-      </p:grpSp>
-      <p:grpSp>
-        <p:nvGrpSpPr>
-          <p:cNvPr id="97" name="Group 96"/>
-          <p:cNvGrpSpPr/>
-          <p:nvPr/>
-        </p:nvGrpSpPr>
-        <p:grpSpPr>
-          <a:xfrm>
-            <a:off x="573639" y="7551565"/>
-            <a:ext cx="2739904" cy="1588722"/>
-            <a:chOff x="4573957" y="7874580"/>
-            <a:chExt cx="2475900" cy="1588722"/>
-          </a:xfrm>
-        </p:grpSpPr>
-        <p:sp>
-          <p:nvSpPr>
-            <p:cNvPr id="91" name="Round Same Side Corner Rectangle 90"/>
-            <p:cNvSpPr/>
-            <p:nvPr/>
-          </p:nvSpPr>
-          <p:spPr>
-            <a:xfrm rot="10800000">
-              <a:off x="4737860" y="7881775"/>
-              <a:ext cx="1763485" cy="293234"/>
+            <a:xfrm rot="5400000">
+              <a:off x="1345400" y="8086380"/>
+              <a:ext cx="957834" cy="264979"/>
             </a:xfrm>
             <a:prstGeom prst="round2SameRect">
               <a:avLst/>
@@ -5121,14 +4475,14 @@
         </p:sp>
         <p:sp>
           <p:nvSpPr>
-            <p:cNvPr id="92" name="TextBox 91"/>
+            <p:cNvPr id="86" name="TextBox 85"/>
             <p:cNvSpPr txBox="1"/>
             <p:nvPr/>
           </p:nvSpPr>
           <p:spPr>
-            <a:xfrm>
-              <a:off x="4573957" y="7881775"/>
-              <a:ext cx="1791838" cy="261610"/>
+            <a:xfrm rot="16200000">
+              <a:off x="1336222" y="8144771"/>
+              <a:ext cx="992936" cy="227872"/>
             </a:xfrm>
             <a:prstGeom prst="rect">
               <a:avLst/>
@@ -5147,118 +4501,9 @@
                   <a:latin typeface="Caviar Dreams"/>
                   <a:cs typeface="Caviar Dreams"/>
                 </a:rPr>
-                <a:t>INTERESTS &amp; VOLUNTEER</a:t>
+                <a:t>EDUCATION</a:t>
               </a:r>
               <a:endParaRPr lang="en-US" sz="1100" b="1" dirty="0">
-                <a:latin typeface="Caviar Dreams"/>
-                <a:cs typeface="Caviar Dreams"/>
-              </a:endParaRPr>
-            </a:p>
-          </p:txBody>
-        </p:sp>
-        <p:sp>
-          <p:nvSpPr>
-            <p:cNvPr id="93" name="TextBox 92"/>
-            <p:cNvSpPr txBox="1"/>
-            <p:nvPr/>
-          </p:nvSpPr>
-          <p:spPr>
-            <a:xfrm>
-              <a:off x="4688601" y="8139863"/>
-              <a:ext cx="2361256" cy="1323439"/>
-            </a:xfrm>
-            <a:prstGeom prst="rect">
-              <a:avLst/>
-            </a:prstGeom>
-            <a:noFill/>
-          </p:spPr>
-          <p:txBody>
-            <a:bodyPr wrap="square" rtlCol="0">
-              <a:spAutoFit/>
-            </a:bodyPr>
-            <a:lstStyle/>
-            <a:p>
-              <a:r>
-                <a:rPr lang="en-US" sz="1000" dirty="0" smtClean="0">
-                  <a:latin typeface="Caviar Dreams"/>
-                  <a:cs typeface="Caviar Dreams"/>
-                </a:rPr>
-                <a:t>Photography, crafting, snowboarding, traveling, ukulele, cooking</a:t>
-              </a:r>
-            </a:p>
-            <a:p>
-              <a:endParaRPr lang="en-US" sz="1000" dirty="0">
-                <a:latin typeface="Caviar Dreams"/>
-                <a:cs typeface="Caviar Dreams"/>
-              </a:endParaRPr>
-            </a:p>
-            <a:p>
-              <a:r>
-                <a:rPr lang="en-US" sz="1000" b="1" dirty="0" smtClean="0">
-                  <a:latin typeface="Caviar Dreams"/>
-                  <a:cs typeface="Caviar Dreams"/>
-                </a:rPr>
-                <a:t>Volunteered with: </a:t>
-              </a:r>
-              <a:r>
-                <a:rPr lang="en-US" sz="1000" dirty="0" smtClean="0">
-                  <a:latin typeface="Caviar Dreams"/>
-                  <a:cs typeface="Caviar Dreams"/>
-                </a:rPr>
-                <a:t>MillionTreesNYC, American Cancer Association, Typhoon Haiyan Disaster Relief, Greater Boston FoodBank, CityHarvest, Project Pasko </a:t>
-              </a:r>
-            </a:p>
-            <a:p>
-              <a:endParaRPr lang="en-US" sz="1000" dirty="0">
-                <a:latin typeface="Caviar Dreams"/>
-                <a:cs typeface="Caviar Dreams"/>
-              </a:endParaRPr>
-            </a:p>
-          </p:txBody>
-        </p:sp>
-        <p:sp>
-          <p:nvSpPr>
-            <p:cNvPr id="89" name="Rectangle 88"/>
-            <p:cNvSpPr/>
-            <p:nvPr/>
-          </p:nvSpPr>
-          <p:spPr>
-            <a:xfrm>
-              <a:off x="4678420" y="7874580"/>
-              <a:ext cx="2350571" cy="1453890"/>
-            </a:xfrm>
-            <a:prstGeom prst="rect">
-              <a:avLst/>
-            </a:prstGeom>
-            <a:noFill/>
-            <a:ln w="6350">
-              <a:solidFill>
-                <a:schemeClr val="tx1"/>
-              </a:solidFill>
-              <a:prstDash val="solid"/>
-            </a:ln>
-            <a:effectLst/>
-          </p:spPr>
-          <p:style>
-            <a:lnRef idx="1">
-              <a:schemeClr val="accent1"/>
-            </a:lnRef>
-            <a:fillRef idx="3">
-              <a:schemeClr val="accent1"/>
-            </a:fillRef>
-            <a:effectRef idx="2">
-              <a:schemeClr val="accent1"/>
-            </a:effectRef>
-            <a:fontRef idx="minor">
-              <a:schemeClr val="lt1"/>
-            </a:fontRef>
-          </p:style>
-          <p:txBody>
-            <a:bodyPr rtlCol="0" anchor="ctr"/>
-            <a:lstStyle/>
-            <a:p>
-              <a:pPr algn="ctr"/>
-              <a:endParaRPr lang="en-US" dirty="0">
                 <a:latin typeface="Caviar Dreams"/>
                 <a:cs typeface="Caviar Dreams"/>
               </a:endParaRPr>
@@ -5268,14 +4513,14 @@
       </p:grpSp>
       <p:sp>
         <p:nvSpPr>
-          <p:cNvPr id="94" name="TextBox 93"/>
+          <p:cNvPr id="87" name="TextBox 86"/>
           <p:cNvSpPr txBox="1"/>
           <p:nvPr/>
         </p:nvSpPr>
         <p:spPr>
-          <a:xfrm rot="16200000">
-            <a:off x="-3508326" y="4073699"/>
-            <a:ext cx="7657040" cy="369332"/>
+          <a:xfrm>
+            <a:off x="3499145" y="7613566"/>
+            <a:ext cx="3130482" cy="1323439"/>
           </a:xfrm>
           <a:prstGeom prst="rect">
             <a:avLst/>
@@ -5288,52 +4533,111 @@
           </a:bodyPr>
           <a:lstStyle/>
           <a:p>
-            <a:pPr algn="ctr"/>
-            <a:r>
-              <a:rPr lang="en-US" b="1" dirty="0" smtClean="0">
-                <a:latin typeface="Caviar Dreams"/>
-                <a:cs typeface="Caviar Dreams"/>
-              </a:rPr>
-              <a:t>WEB DEVELOPER  </a:t>
-            </a:r>
-            <a:r>
-              <a:rPr lang="en-US" dirty="0" smtClean="0">
-                <a:latin typeface="Caviar Dreams"/>
-                <a:cs typeface="Caviar Dreams"/>
-              </a:rPr>
-              <a:t>DESIGNER</a:t>
-            </a:r>
-            <a:r>
-              <a:rPr lang="en-US" b="1" dirty="0" smtClean="0">
-                <a:latin typeface="Caviar Dreams"/>
-                <a:cs typeface="Caviar Dreams"/>
-              </a:rPr>
-              <a:t>  RESEARCHER  </a:t>
-            </a:r>
-            <a:r>
-              <a:rPr lang="en-US" dirty="0" smtClean="0">
-                <a:latin typeface="Caviar Dreams"/>
-                <a:cs typeface="Caviar Dreams"/>
-              </a:rPr>
-              <a:t>STORYTELLER</a:t>
-            </a:r>
-            <a:endParaRPr lang="en-US" dirty="0">
+            <a:r>
+              <a:rPr lang="en-US" sz="1000" b="1" dirty="0" smtClean="0">
+                <a:latin typeface="Caviar Dreams"/>
+                <a:cs typeface="Caviar Dreams"/>
+              </a:rPr>
+              <a:t>GENERAL ASSEMBLY</a:t>
+            </a:r>
+          </a:p>
+          <a:p>
+            <a:r>
+              <a:rPr lang="en-US" sz="1000" dirty="0" smtClean="0">
+                <a:latin typeface="Caviar Dreams"/>
+                <a:cs typeface="Caviar Dreams"/>
+              </a:rPr>
+              <a:t>WEB DEVELOPMENT IMMERSIVE</a:t>
+            </a:r>
+          </a:p>
+          <a:p>
+            <a:r>
+              <a:rPr lang="en-US" sz="1000" dirty="0" smtClean="0">
+                <a:latin typeface="Caviar Dreams"/>
+                <a:cs typeface="Caviar Dreams"/>
+              </a:rPr>
+              <a:t>Graduate of the September 2014 Cohort</a:t>
+            </a:r>
+          </a:p>
+          <a:p>
+            <a:endParaRPr lang="en-US" sz="1000" b="1" dirty="0" smtClean="0">
               <a:latin typeface="Caviar Dreams"/>
               <a:cs typeface="Caviar Dreams"/>
             </a:endParaRPr>
           </a:p>
-        </p:txBody>
-      </p:sp>
-      <p:sp>
-        <p:nvSpPr>
-          <p:cNvPr id="81" name="Rectangle 80"/>
+          <a:p>
+            <a:r>
+              <a:rPr lang="en-US" sz="1000" b="1" dirty="0" smtClean="0">
+                <a:latin typeface="Caviar Dreams"/>
+                <a:cs typeface="Caviar Dreams"/>
+              </a:rPr>
+              <a:t>BOSTON UNIVERSITY 2007</a:t>
+            </a:r>
+          </a:p>
+          <a:p>
+            <a:r>
+              <a:rPr lang="en-US" sz="1000" dirty="0" smtClean="0">
+                <a:latin typeface="Caviar Dreams"/>
+                <a:cs typeface="Caviar Dreams"/>
+              </a:rPr>
+              <a:t>Bachelor of Science, </a:t>
+            </a:r>
+            <a:r>
+              <a:rPr lang="en-US" sz="1000" i="1" dirty="0" smtClean="0">
+                <a:latin typeface="Caviar Dreams"/>
+                <a:cs typeface="Caviar Dreams"/>
+              </a:rPr>
+              <a:t>School of Communication</a:t>
+            </a:r>
+          </a:p>
+          <a:p>
+            <a:r>
+              <a:rPr lang="en-US" sz="1000" dirty="0" smtClean="0">
+                <a:latin typeface="Caviar Dreams"/>
+                <a:cs typeface="Caviar Dreams"/>
+              </a:rPr>
+              <a:t>Minor, </a:t>
+            </a:r>
+            <a:r>
+              <a:rPr lang="en-US" sz="1000" i="1" dirty="0" smtClean="0">
+                <a:latin typeface="Caviar Dreams"/>
+                <a:cs typeface="Caviar Dreams"/>
+              </a:rPr>
+              <a:t>School of Management</a:t>
+            </a:r>
+          </a:p>
+          <a:p>
+            <a:r>
+              <a:rPr lang="en-US" sz="1000" dirty="0" smtClean="0">
+                <a:latin typeface="Caviar Dreams"/>
+                <a:cs typeface="Caviar Dreams"/>
+              </a:rPr>
+              <a:t>Concentration, Psychology, </a:t>
+            </a:r>
+            <a:r>
+              <a:rPr lang="en-US" sz="1000" i="1" dirty="0" smtClean="0">
+                <a:latin typeface="Caviar Dreams"/>
+                <a:cs typeface="Caviar Dreams"/>
+              </a:rPr>
+              <a:t>School of Liberal Arts</a:t>
+            </a:r>
+            <a:endParaRPr lang="en-US" sz="1000" i="1" dirty="0">
+              <a:latin typeface="Caviar Dreams"/>
+              <a:cs typeface="Caviar Dreams"/>
+            </a:endParaRPr>
+          </a:p>
+        </p:txBody>
+      </p:sp>
+      <p:sp>
+        <p:nvSpPr>
+          <p:cNvPr id="83" name="Rectangle 82"/>
           <p:cNvSpPr/>
           <p:nvPr/>
         </p:nvSpPr>
         <p:spPr>
           <a:xfrm>
-            <a:off x="689251" y="914400"/>
-            <a:ext cx="5955530" cy="6527092"/>
+            <a:off x="3375045" y="7551565"/>
+            <a:ext cx="3269736" cy="1453890"/>
           </a:xfrm>
           <a:prstGeom prst="rect">
             <a:avLst/>
@@ -5341,7 +4645,9 @@
           <a:noFill/>
           <a:ln w="6350">
             <a:solidFill>
-              <a:schemeClr val="tx1"/>
+              <a:schemeClr val="bg1">
+                <a:lumMod val="50000"/>
+              </a:schemeClr>
             </a:solidFill>
             <a:prstDash val="solid"/>
           </a:ln>
@@ -5375,14 +4681,64 @@
       </p:sp>
       <p:sp>
         <p:nvSpPr>
-          <p:cNvPr id="41" name="TextBox 40"/>
+          <p:cNvPr id="91" name="Round Same Side Corner Rectangle 90"/>
+          <p:cNvSpPr/>
+          <p:nvPr/>
+        </p:nvSpPr>
+        <p:spPr>
+          <a:xfrm rot="10800000">
+            <a:off x="274173" y="7558760"/>
+            <a:ext cx="1951525" cy="293234"/>
+          </a:xfrm>
+          <a:prstGeom prst="round2SameRect">
+            <a:avLst/>
+          </a:prstGeom>
+          <a:solidFill>
+            <a:schemeClr val="bg1">
+              <a:lumMod val="75000"/>
+            </a:schemeClr>
+          </a:solidFill>
+          <a:ln>
+            <a:noFill/>
+          </a:ln>
+          <a:effectLst/>
+        </p:spPr>
+        <p:style>
+          <a:lnRef idx="1">
+            <a:schemeClr val="accent1"/>
+          </a:lnRef>
+          <a:fillRef idx="3">
+            <a:schemeClr val="accent1"/>
+          </a:fillRef>
+          <a:effectRef idx="2">
+            <a:schemeClr val="accent1"/>
+          </a:effectRef>
+          <a:fontRef idx="minor">
+            <a:schemeClr val="lt1"/>
+          </a:fontRef>
+        </p:style>
+        <p:txBody>
+          <a:bodyPr rtlCol="0" anchor="ctr"/>
+          <a:lstStyle/>
+          <a:p>
+            <a:pPr algn="ctr"/>
+            <a:endParaRPr lang="en-US" dirty="0">
+              <a:latin typeface="Caviar Dreams"/>
+              <a:cs typeface="Caviar Dreams"/>
+            </a:endParaRPr>
+          </a:p>
+        </p:txBody>
+      </p:sp>
+      <p:sp>
+        <p:nvSpPr>
+          <p:cNvPr id="92" name="TextBox 91"/>
           <p:cNvSpPr txBox="1"/>
           <p:nvPr/>
         </p:nvSpPr>
         <p:spPr>
           <a:xfrm>
-            <a:off x="2578756" y="1281879"/>
-            <a:ext cx="4296164" cy="1061829"/>
+            <a:off x="92793" y="7558760"/>
+            <a:ext cx="1982901" cy="261610"/>
           </a:xfrm>
           <a:prstGeom prst="rect">
             <a:avLst/>
@@ -5395,303 +4751,787 @@
           </a:bodyPr>
           <a:lstStyle/>
           <a:p>
-            <a:pPr lvl="0"/>
-            <a:r>
-              <a:rPr lang="en-US" sz="900" b="1" dirty="0">
-                <a:latin typeface="Caviar Dreams"/>
-                <a:cs typeface="Caviar Dreams"/>
-              </a:rPr>
-              <a:t>Languages: </a:t>
-            </a:r>
-            <a:r>
-              <a:rPr lang="en-US" sz="900" dirty="0">
-                <a:latin typeface="Caviar Dreams"/>
-                <a:cs typeface="Caviar Dreams"/>
-              </a:rPr>
-              <a:t>Ruby, Javascript, HTML5, CSS3</a:t>
-            </a:r>
-          </a:p>
-          <a:p>
-            <a:pPr lvl="0"/>
-            <a:r>
-              <a:rPr lang="en-US" sz="900" b="1" dirty="0" smtClean="0">
-                <a:latin typeface="Caviar Dreams"/>
-                <a:cs typeface="Caviar Dreams"/>
-              </a:rPr>
-              <a:t>Frameworks/</a:t>
-            </a:r>
-            <a:r>
-              <a:rPr lang="en-US" sz="900" b="1" dirty="0" err="1" smtClean="0">
-                <a:latin typeface="Caviar Dreams"/>
-                <a:cs typeface="Caviar Dreams"/>
-              </a:rPr>
-              <a:t>Libaries</a:t>
-            </a:r>
-            <a:r>
-              <a:rPr lang="en-US" sz="900" b="1" dirty="0" smtClean="0">
-                <a:latin typeface="Caviar Dreams"/>
-                <a:cs typeface="Caviar Dreams"/>
-              </a:rPr>
-              <a:t>:</a:t>
-            </a:r>
-            <a:r>
-              <a:rPr lang="en-US" sz="900" b="1" dirty="0">
-                <a:latin typeface="Caviar Dreams"/>
-                <a:cs typeface="Caviar Dreams"/>
-              </a:rPr>
-              <a:t> </a:t>
-            </a:r>
-            <a:r>
-              <a:rPr lang="en-US" sz="900" dirty="0" smtClean="0">
-                <a:latin typeface="Caviar Dreams"/>
-                <a:cs typeface="Caviar Dreams"/>
-              </a:rPr>
-              <a:t>Sinatra, Rails</a:t>
-            </a:r>
-            <a:r>
-              <a:rPr lang="en-US" sz="900" dirty="0">
-                <a:latin typeface="Caviar Dreams"/>
-                <a:cs typeface="Caviar Dreams"/>
-              </a:rPr>
-              <a:t>, </a:t>
-            </a:r>
-            <a:r>
-              <a:rPr lang="en-US" sz="900" dirty="0" err="1" smtClean="0">
-                <a:latin typeface="Caviar Dreams"/>
-                <a:cs typeface="Caviar Dreams"/>
-              </a:rPr>
-              <a:t>Backbone.js</a:t>
-            </a:r>
-            <a:r>
-              <a:rPr lang="en-US" sz="900" dirty="0" smtClean="0">
-                <a:latin typeface="Caviar Dreams"/>
-                <a:cs typeface="Caviar Dreams"/>
-              </a:rPr>
-              <a:t>, </a:t>
-            </a:r>
-            <a:r>
-              <a:rPr lang="en-US" sz="900" dirty="0" err="1" smtClean="0">
-                <a:latin typeface="Caviar Dreams"/>
-                <a:cs typeface="Caviar Dreams"/>
-              </a:rPr>
-              <a:t>Underscore.js</a:t>
-            </a:r>
-            <a:r>
-              <a:rPr lang="en-US" sz="900" dirty="0" smtClean="0">
-                <a:latin typeface="Caviar Dreams"/>
-                <a:cs typeface="Caviar Dreams"/>
-              </a:rPr>
-              <a:t>, </a:t>
-            </a:r>
-            <a:r>
-              <a:rPr lang="en-US" sz="900" dirty="0">
-                <a:latin typeface="Caviar Dreams"/>
-                <a:cs typeface="Caviar Dreams"/>
-              </a:rPr>
-              <a:t>jQuery, </a:t>
-            </a:r>
-            <a:endParaRPr lang="en-US" sz="900" dirty="0" smtClean="0">
+            <a:pPr algn="r"/>
+            <a:r>
+              <a:rPr lang="en-US" sz="1100" b="1" dirty="0" smtClean="0">
+                <a:latin typeface="Caviar Dreams"/>
+                <a:cs typeface="Caviar Dreams"/>
+              </a:rPr>
+              <a:t>INTERESTS &amp; VOLUNTEER</a:t>
+            </a:r>
+            <a:endParaRPr lang="en-US" sz="1100" b="1" dirty="0">
               <a:latin typeface="Caviar Dreams"/>
               <a:cs typeface="Caviar Dreams"/>
             </a:endParaRPr>
           </a:p>
-          <a:p>
-            <a:pPr lvl="0"/>
-            <a:r>
-              <a:rPr lang="en-US" sz="900" dirty="0" smtClean="0">
-                <a:latin typeface="Caviar Dreams"/>
-                <a:cs typeface="Caviar Dreams"/>
-              </a:rPr>
-              <a:t>  AJAX</a:t>
-            </a:r>
-            <a:r>
-              <a:rPr lang="en-US" sz="900" dirty="0">
-                <a:latin typeface="Caviar Dreams"/>
-                <a:cs typeface="Caviar Dreams"/>
-              </a:rPr>
-              <a:t>, </a:t>
-            </a:r>
-            <a:r>
-              <a:rPr lang="en-US" sz="900" dirty="0" smtClean="0">
-                <a:latin typeface="Caviar Dreams"/>
-                <a:cs typeface="Caviar Dreams"/>
-              </a:rPr>
-              <a:t>JSON</a:t>
-            </a:r>
-          </a:p>
-          <a:p>
-            <a:pPr lvl="0"/>
-            <a:r>
-              <a:rPr lang="en-US" sz="900" b="1" dirty="0" smtClean="0">
-                <a:latin typeface="Caviar Dreams"/>
-                <a:cs typeface="Caviar Dreams"/>
-              </a:rPr>
-              <a:t>Database </a:t>
-            </a:r>
-            <a:r>
-              <a:rPr lang="en-US" sz="900" b="1" dirty="0">
-                <a:latin typeface="Caviar Dreams"/>
-                <a:cs typeface="Caviar Dreams"/>
-              </a:rPr>
-              <a:t>Tools: </a:t>
-            </a:r>
-            <a:r>
-              <a:rPr lang="en-US" sz="900" dirty="0">
-                <a:latin typeface="Caviar Dreams"/>
-                <a:cs typeface="Caviar Dreams"/>
-              </a:rPr>
-              <a:t>SQL, PostgreSQL, ActiveRecord, BCrypt</a:t>
-            </a:r>
-          </a:p>
-          <a:p>
-            <a:pPr lvl="0"/>
-            <a:r>
-              <a:rPr lang="en-US" sz="900" b="1" dirty="0">
-                <a:latin typeface="Caviar Dreams"/>
-                <a:cs typeface="Caviar Dreams"/>
-              </a:rPr>
-              <a:t>Styling/Design: </a:t>
-            </a:r>
-            <a:r>
-              <a:rPr lang="en-US" sz="900" dirty="0">
-                <a:latin typeface="Caviar Dreams"/>
-                <a:cs typeface="Caviar Dreams"/>
-              </a:rPr>
-              <a:t>CSS3, SASS, Bourbon, </a:t>
-            </a:r>
-            <a:r>
-              <a:rPr lang="en-US" sz="900" dirty="0" smtClean="0">
-                <a:latin typeface="Caviar Dreams"/>
-                <a:cs typeface="Caviar Dreams"/>
-              </a:rPr>
-              <a:t>Skeleton</a:t>
-            </a:r>
-          </a:p>
-          <a:p>
-            <a:pPr lvl="0"/>
-            <a:r>
-              <a:rPr lang="en-US" sz="900" b="1" dirty="0" smtClean="0">
-                <a:latin typeface="Caviar Dreams"/>
-                <a:cs typeface="Caviar Dreams"/>
-              </a:rPr>
-              <a:t>Tools</a:t>
-            </a:r>
-            <a:r>
-              <a:rPr lang="en-US" sz="900" dirty="0" smtClean="0">
-                <a:latin typeface="Caviar Dreams"/>
-                <a:cs typeface="Caviar Dreams"/>
-              </a:rPr>
-              <a:t>: Adobe Photoshop, Microsoft PowerPoint </a:t>
-            </a:r>
-          </a:p>
-          <a:p>
-            <a:endParaRPr lang="en-US" sz="900" dirty="0">
+        </p:txBody>
+      </p:sp>
+      <p:sp>
+        <p:nvSpPr>
+          <p:cNvPr id="93" name="TextBox 92"/>
+          <p:cNvSpPr txBox="1"/>
+          <p:nvPr/>
+        </p:nvSpPr>
+        <p:spPr>
+          <a:xfrm>
+            <a:off x="219660" y="7835662"/>
+            <a:ext cx="3011783" cy="1323439"/>
+          </a:xfrm>
+          <a:prstGeom prst="rect">
+            <a:avLst/>
+          </a:prstGeom>
+          <a:noFill/>
+        </p:spPr>
+        <p:txBody>
+          <a:bodyPr wrap="square" rtlCol="0">
+            <a:spAutoFit/>
+          </a:bodyPr>
+          <a:lstStyle/>
+          <a:p>
+            <a:r>
+              <a:rPr lang="en-US" sz="1000" dirty="0" smtClean="0">
+                <a:latin typeface="Caviar Dreams"/>
+                <a:cs typeface="Caviar Dreams"/>
+              </a:rPr>
+              <a:t>Photography, crafting, snowboarding, traveling, ukulele, cooking</a:t>
+            </a:r>
+          </a:p>
+          <a:p>
+            <a:endParaRPr lang="en-US" sz="1000" dirty="0">
               <a:latin typeface="Caviar Dreams"/>
               <a:cs typeface="Caviar Dreams"/>
             </a:endParaRPr>
           </a:p>
-        </p:txBody>
-      </p:sp>
-      <p:grpSp>
-        <p:nvGrpSpPr>
-          <p:cNvPr id="43" name="Group 42"/>
-          <p:cNvGrpSpPr/>
+          <a:p>
+            <a:r>
+              <a:rPr lang="en-US" sz="1000" b="1" dirty="0" smtClean="0">
+                <a:latin typeface="Caviar Dreams"/>
+                <a:cs typeface="Caviar Dreams"/>
+              </a:rPr>
+              <a:t>Volunteered with: </a:t>
+            </a:r>
+            <a:r>
+              <a:rPr lang="en-US" sz="1000" dirty="0" smtClean="0">
+                <a:latin typeface="Caviar Dreams"/>
+                <a:cs typeface="Caviar Dreams"/>
+              </a:rPr>
+              <a:t>MillionTreesNYC, American Cancer Association, Typhoon Haiyan Disaster Relief, Greater Boston FoodBank, CityHarvest, Project Pasko </a:t>
+            </a:r>
+          </a:p>
+          <a:p>
+            <a:endParaRPr lang="en-US" sz="1000" dirty="0">
+              <a:latin typeface="Caviar Dreams"/>
+              <a:cs typeface="Caviar Dreams"/>
+            </a:endParaRPr>
+          </a:p>
+        </p:txBody>
+      </p:sp>
+      <p:sp>
+        <p:nvSpPr>
+          <p:cNvPr id="89" name="Rectangle 88"/>
+          <p:cNvSpPr/>
           <p:nvPr/>
-        </p:nvGrpSpPr>
-        <p:grpSpPr>
+        </p:nvSpPr>
+        <p:spPr>
           <a:xfrm>
-            <a:off x="4966014" y="545381"/>
-            <a:ext cx="216543" cy="253916"/>
-            <a:chOff x="3181110" y="177579"/>
-            <a:chExt cx="389899" cy="457194"/>
+            <a:off x="208395" y="7551565"/>
+            <a:ext cx="3023049" cy="1453890"/>
           </a:xfrm>
-        </p:grpSpPr>
-        <p:sp>
-          <p:nvSpPr>
-            <p:cNvPr id="44" name="Oval 43"/>
-            <p:cNvSpPr/>
-            <p:nvPr/>
-          </p:nvSpPr>
-          <p:spPr>
-            <a:xfrm>
-              <a:off x="3194627" y="244766"/>
-              <a:ext cx="376382" cy="376382"/>
-            </a:xfrm>
-            <a:prstGeom prst="ellipse">
-              <a:avLst/>
-            </a:prstGeom>
+          <a:prstGeom prst="rect">
+            <a:avLst/>
+          </a:prstGeom>
+          <a:noFill/>
+          <a:ln w="6350">
             <a:solidFill>
               <a:schemeClr val="bg1">
                 <a:lumMod val="50000"/>
               </a:schemeClr>
             </a:solidFill>
-            <a:ln>
-              <a:noFill/>
-            </a:ln>
-            <a:effectLst/>
-          </p:spPr>
-          <p:style>
-            <a:lnRef idx="1">
-              <a:schemeClr val="accent1"/>
-            </a:lnRef>
-            <a:fillRef idx="3">
-              <a:schemeClr val="accent1"/>
-            </a:fillRef>
-            <a:effectRef idx="2">
-              <a:schemeClr val="accent1"/>
-            </a:effectRef>
-            <a:fontRef idx="minor">
-              <a:schemeClr val="lt1"/>
-            </a:fontRef>
-          </p:style>
-          <p:txBody>
-            <a:bodyPr rtlCol="0" anchor="ctr"/>
-            <a:lstStyle/>
-            <a:p>
-              <a:pPr algn="ctr"/>
-              <a:endParaRPr lang="en-US" sz="1050" dirty="0">
-                <a:latin typeface="Caviar Dreams"/>
-                <a:cs typeface="Caviar Dreams"/>
-              </a:endParaRPr>
-            </a:p>
-          </p:txBody>
-        </p:sp>
-        <p:sp>
-          <p:nvSpPr>
-            <p:cNvPr id="46" name="TextBox 45"/>
-            <p:cNvSpPr txBox="1"/>
-            <p:nvPr/>
-          </p:nvSpPr>
-          <p:spPr>
-            <a:xfrm>
-              <a:off x="3181110" y="177579"/>
-              <a:ext cx="288637" cy="457194"/>
-            </a:xfrm>
-            <a:prstGeom prst="rect">
-              <a:avLst/>
-            </a:prstGeom>
-            <a:noFill/>
-          </p:spPr>
-          <p:txBody>
-            <a:bodyPr wrap="square" rtlCol="0">
-              <a:spAutoFit/>
-            </a:bodyPr>
-            <a:lstStyle/>
-            <a:p>
-              <a:r>
-                <a:rPr lang="en-US" sz="1050" b="1" dirty="0">
-                  <a:solidFill>
-                    <a:schemeClr val="bg1"/>
-                  </a:solidFill>
-                  <a:latin typeface="Caviar Dreams"/>
-                  <a:cs typeface="Caviar Dreams"/>
-                </a:rPr>
-                <a:t>w</a:t>
-              </a:r>
-            </a:p>
-          </p:txBody>
-        </p:sp>
-      </p:grpSp>
+            <a:prstDash val="solid"/>
+          </a:ln>
+          <a:effectLst/>
+        </p:spPr>
+        <p:style>
+          <a:lnRef idx="1">
+            <a:schemeClr val="accent1"/>
+          </a:lnRef>
+          <a:fillRef idx="3">
+            <a:schemeClr val="accent1"/>
+          </a:fillRef>
+          <a:effectRef idx="2">
+            <a:schemeClr val="accent1"/>
+          </a:effectRef>
+          <a:fontRef idx="minor">
+            <a:schemeClr val="lt1"/>
+          </a:fontRef>
+        </p:style>
+        <p:txBody>
+          <a:bodyPr rtlCol="0" anchor="ctr"/>
+          <a:lstStyle/>
+          <a:p>
+            <a:pPr algn="ctr"/>
+            <a:endParaRPr lang="en-US" dirty="0">
+              <a:latin typeface="Caviar Dreams"/>
+              <a:cs typeface="Caviar Dreams"/>
+            </a:endParaRPr>
+          </a:p>
+        </p:txBody>
+      </p:sp>
+      <p:sp>
+        <p:nvSpPr>
+          <p:cNvPr id="81" name="Rectangle 80"/>
+          <p:cNvSpPr/>
+          <p:nvPr/>
+        </p:nvSpPr>
+        <p:spPr>
+          <a:xfrm>
+            <a:off x="211667" y="1676749"/>
+            <a:ext cx="6433114" cy="5764743"/>
+          </a:xfrm>
+          <a:prstGeom prst="rect">
+            <a:avLst/>
+          </a:prstGeom>
+          <a:noFill/>
+          <a:ln w="6350">
+            <a:solidFill>
+              <a:schemeClr val="bg1">
+                <a:lumMod val="50000"/>
+              </a:schemeClr>
+            </a:solidFill>
+            <a:prstDash val="solid"/>
+          </a:ln>
+          <a:effectLst/>
+        </p:spPr>
+        <p:style>
+          <a:lnRef idx="1">
+            <a:schemeClr val="accent1"/>
+          </a:lnRef>
+          <a:fillRef idx="3">
+            <a:schemeClr val="accent1"/>
+          </a:fillRef>
+          <a:effectRef idx="2">
+            <a:schemeClr val="accent1"/>
+          </a:effectRef>
+          <a:fontRef idx="minor">
+            <a:schemeClr val="lt1"/>
+          </a:fontRef>
+        </p:style>
+        <p:txBody>
+          <a:bodyPr rtlCol="0" anchor="ctr"/>
+          <a:lstStyle/>
+          <a:p>
+            <a:pPr algn="ctr"/>
+            <a:endParaRPr lang="en-US" dirty="0">
+              <a:latin typeface="Caviar Dreams"/>
+              <a:cs typeface="Caviar Dreams"/>
+            </a:endParaRPr>
+          </a:p>
+        </p:txBody>
+      </p:sp>
+      <p:sp>
+        <p:nvSpPr>
+          <p:cNvPr id="41" name="TextBox 40"/>
+          <p:cNvSpPr txBox="1"/>
+          <p:nvPr/>
+        </p:nvSpPr>
+        <p:spPr>
+          <a:xfrm>
+            <a:off x="292987" y="979212"/>
+            <a:ext cx="3129475" cy="507831"/>
+          </a:xfrm>
+          <a:prstGeom prst="rect">
+            <a:avLst/>
+          </a:prstGeom>
+          <a:noFill/>
+        </p:spPr>
+        <p:txBody>
+          <a:bodyPr wrap="square" rtlCol="0">
+            <a:spAutoFit/>
+          </a:bodyPr>
+          <a:lstStyle/>
+          <a:p>
+            <a:pPr lvl="0"/>
+            <a:r>
+              <a:rPr lang="en-US" sz="900" b="1" dirty="0">
+                <a:latin typeface="Caviar Dreams"/>
+                <a:cs typeface="Caviar Dreams"/>
+              </a:rPr>
+              <a:t>Languages: </a:t>
+            </a:r>
+            <a:r>
+              <a:rPr lang="en-US" sz="900" dirty="0" smtClean="0">
+                <a:latin typeface="Caviar Dreams"/>
+                <a:cs typeface="Caviar Dreams"/>
+              </a:rPr>
+              <a:t>JavaScript, </a:t>
+            </a:r>
+            <a:r>
+              <a:rPr lang="en-US" sz="900" dirty="0" smtClean="0">
+                <a:latin typeface="Caviar Dreams"/>
+                <a:cs typeface="Caviar Dreams"/>
+              </a:rPr>
+              <a:t>Ruby, HTML, CSS</a:t>
+            </a:r>
+            <a:endParaRPr lang="en-US" sz="900" dirty="0">
+              <a:latin typeface="Caviar Dreams"/>
+              <a:cs typeface="Caviar Dreams"/>
+            </a:endParaRPr>
+          </a:p>
+          <a:p>
+            <a:pPr lvl="0"/>
+            <a:r>
+              <a:rPr lang="en-US" sz="900" b="1" dirty="0" smtClean="0">
+                <a:latin typeface="Caviar Dreams"/>
+                <a:cs typeface="Caviar Dreams"/>
+              </a:rPr>
+              <a:t>Frameworks</a:t>
+            </a:r>
+            <a:r>
+              <a:rPr lang="en-US" sz="900" b="1" dirty="0" smtClean="0">
+                <a:latin typeface="Caviar Dreams"/>
+                <a:cs typeface="Caviar Dreams"/>
+              </a:rPr>
+              <a:t>/Libraries:</a:t>
+            </a:r>
+            <a:r>
+              <a:rPr lang="en-US" sz="900" b="1" dirty="0">
+                <a:latin typeface="Caviar Dreams"/>
+                <a:cs typeface="Caviar Dreams"/>
+              </a:rPr>
+              <a:t> </a:t>
+            </a:r>
+            <a:r>
+              <a:rPr lang="en-US" sz="900" dirty="0" smtClean="0">
+                <a:latin typeface="Caviar Dreams"/>
+                <a:cs typeface="Caviar Dreams"/>
+              </a:rPr>
+              <a:t>Backbone, Underscore, </a:t>
+            </a:r>
+            <a:r>
+              <a:rPr lang="en-US" sz="900" dirty="0" smtClean="0">
+                <a:latin typeface="Caviar Dreams"/>
+                <a:cs typeface="Caviar Dreams"/>
+              </a:rPr>
+              <a:t>jQuery</a:t>
+            </a:r>
+            <a:r>
+              <a:rPr lang="en-US" sz="900" dirty="0" smtClean="0">
+                <a:latin typeface="Caviar Dreams"/>
+                <a:cs typeface="Caviar Dreams"/>
+              </a:rPr>
+              <a:t>, Sinatra, Rails, </a:t>
+            </a:r>
+            <a:r>
+              <a:rPr lang="en-US" sz="900" dirty="0" smtClean="0">
+                <a:latin typeface="Caviar Dreams"/>
+                <a:cs typeface="Caviar Dreams"/>
+              </a:rPr>
+              <a:t>Jade</a:t>
+            </a:r>
+            <a:endParaRPr lang="en-US" sz="900" dirty="0" smtClean="0">
+              <a:latin typeface="Caviar Dreams"/>
+              <a:cs typeface="Caviar Dreams"/>
+            </a:endParaRPr>
+          </a:p>
+        </p:txBody>
+      </p:sp>
+      <p:sp>
+        <p:nvSpPr>
+          <p:cNvPr id="39" name="TextBox 38"/>
+          <p:cNvSpPr txBox="1"/>
+          <p:nvPr/>
+        </p:nvSpPr>
+        <p:spPr>
+          <a:xfrm>
+            <a:off x="498229" y="1816258"/>
+            <a:ext cx="1468106" cy="707886"/>
+          </a:xfrm>
+          <a:prstGeom prst="rect">
+            <a:avLst/>
+          </a:prstGeom>
+          <a:noFill/>
+        </p:spPr>
+        <p:txBody>
+          <a:bodyPr wrap="square" rtlCol="0">
+            <a:spAutoFit/>
+          </a:bodyPr>
+          <a:lstStyle/>
+          <a:p>
+            <a:pPr algn="r"/>
+            <a:r>
+              <a:rPr lang="en-US" sz="1000" b="1" dirty="0" smtClean="0">
+                <a:latin typeface="Caviar Dreams"/>
+                <a:cs typeface="Caviar Dreams"/>
+              </a:rPr>
+              <a:t>TD AMERITRADE</a:t>
+            </a:r>
+          </a:p>
+          <a:p>
+            <a:pPr algn="r"/>
+            <a:r>
+              <a:rPr lang="en-US" sz="1000" dirty="0" smtClean="0">
+                <a:latin typeface="Caviar Dreams"/>
+                <a:cs typeface="Caviar Dreams"/>
+              </a:rPr>
+              <a:t>WEB DEVELOPER</a:t>
+            </a:r>
+          </a:p>
+          <a:p>
+            <a:pPr algn="r"/>
+            <a:r>
+              <a:rPr lang="en-US" sz="1000" dirty="0" smtClean="0">
+                <a:latin typeface="Caviar Dreams"/>
+                <a:cs typeface="Caviar Dreams"/>
+              </a:rPr>
+              <a:t>APPRENTICE</a:t>
+            </a:r>
+          </a:p>
+          <a:p>
+            <a:pPr algn="r"/>
+            <a:r>
+              <a:rPr lang="en-US" sz="1000" dirty="0" smtClean="0">
+                <a:latin typeface="Caviar Dreams"/>
+                <a:cs typeface="Caviar Dreams"/>
+              </a:rPr>
+              <a:t>Feb 2015 to Present </a:t>
+            </a:r>
+            <a:endParaRPr lang="en-US" sz="1000" dirty="0">
+              <a:latin typeface="Caviar Dreams"/>
+              <a:cs typeface="Caviar Dreams"/>
+            </a:endParaRPr>
+          </a:p>
+        </p:txBody>
+      </p:sp>
+      <p:sp>
+        <p:nvSpPr>
+          <p:cNvPr id="40" name="TextBox 39"/>
+          <p:cNvSpPr txBox="1"/>
+          <p:nvPr/>
+        </p:nvSpPr>
+        <p:spPr>
+          <a:xfrm>
+            <a:off x="1966335" y="1816258"/>
+            <a:ext cx="4755983" cy="1477328"/>
+          </a:xfrm>
+          <a:prstGeom prst="rect">
+            <a:avLst/>
+          </a:prstGeom>
+          <a:noFill/>
+        </p:spPr>
+        <p:txBody>
+          <a:bodyPr wrap="square" rtlCol="0">
+            <a:spAutoFit/>
+          </a:bodyPr>
+          <a:lstStyle/>
+          <a:p>
+            <a:pPr marL="171450" indent="-171450">
+              <a:buFont typeface="Arial"/>
+              <a:buChar char="•"/>
+            </a:pPr>
+            <a:r>
+              <a:rPr lang="en-US" sz="1000" dirty="0" smtClean="0">
+                <a:latin typeface="Caviar Dreams"/>
+                <a:cs typeface="Caviar Dreams"/>
+              </a:rPr>
+              <a:t>Collaborate with </a:t>
+            </a:r>
+            <a:r>
+              <a:rPr lang="en-US" sz="1000" dirty="0" smtClean="0">
+                <a:latin typeface="Caviar Dreams"/>
+                <a:cs typeface="Caviar Dreams"/>
+              </a:rPr>
+              <a:t>UI team</a:t>
+            </a:r>
+            <a:r>
+              <a:rPr lang="en-US" sz="1000" dirty="0">
+                <a:latin typeface="Caviar Dreams"/>
+                <a:cs typeface="Caviar Dreams"/>
+              </a:rPr>
+              <a:t> </a:t>
+            </a:r>
+            <a:r>
+              <a:rPr lang="en-US" sz="1000" dirty="0" smtClean="0">
+                <a:latin typeface="Caviar Dreams"/>
+                <a:cs typeface="Caviar Dreams"/>
+              </a:rPr>
+              <a:t>and designers to cr</a:t>
+            </a:r>
+            <a:r>
+              <a:rPr lang="en-US" sz="1000" dirty="0" smtClean="0">
+                <a:latin typeface="Caviar Dreams"/>
+                <a:cs typeface="Caviar Dreams"/>
+              </a:rPr>
+              <a:t>eate key pages for a </a:t>
+            </a:r>
+            <a:r>
+              <a:rPr lang="en-US" sz="1000" dirty="0" smtClean="0">
+                <a:latin typeface="Caviar Dreams"/>
+                <a:cs typeface="Caviar Dreams"/>
+              </a:rPr>
+              <a:t>Node.js</a:t>
+            </a:r>
+            <a:r>
+              <a:rPr lang="en-US" sz="1000" dirty="0" smtClean="0">
+                <a:latin typeface="Caviar Dreams"/>
+                <a:cs typeface="Caviar Dreams"/>
+              </a:rPr>
+              <a:t>-based education site</a:t>
+            </a:r>
+            <a:r>
+              <a:rPr lang="en-US" sz="1000" dirty="0" smtClean="0">
+                <a:latin typeface="Caviar Dreams"/>
+                <a:cs typeface="Caviar Dreams"/>
+              </a:rPr>
+              <a:t>, </a:t>
+            </a:r>
+            <a:r>
+              <a:rPr lang="en-US" sz="1000" dirty="0" smtClean="0">
+                <a:latin typeface="Caviar Dreams"/>
+                <a:cs typeface="Caviar Dreams"/>
+              </a:rPr>
+              <a:t>implementing Jade, Stylus and </a:t>
+            </a:r>
+            <a:r>
+              <a:rPr lang="en-US" sz="1000" dirty="0" smtClean="0">
+                <a:latin typeface="Caviar Dreams"/>
+                <a:cs typeface="Caviar Dreams"/>
+              </a:rPr>
+              <a:t>Jeet</a:t>
+            </a:r>
+            <a:r>
+              <a:rPr lang="en-US" sz="1000" dirty="0" smtClean="0">
+                <a:latin typeface="Caviar Dreams"/>
+                <a:cs typeface="Caviar Dreams"/>
+              </a:rPr>
+              <a:t>.gs</a:t>
+            </a:r>
+            <a:endParaRPr lang="en-US" sz="1000" dirty="0" smtClean="0">
+              <a:latin typeface="Caviar Dreams"/>
+              <a:cs typeface="Caviar Dreams"/>
+            </a:endParaRPr>
+          </a:p>
+          <a:p>
+            <a:pPr marL="171450" indent="-171450">
+              <a:buFont typeface="Arial"/>
+              <a:buChar char="•"/>
+            </a:pPr>
+            <a:r>
+              <a:rPr lang="en-US" sz="1000" dirty="0" smtClean="0">
+                <a:latin typeface="Caviar Dreams"/>
+                <a:cs typeface="Caviar Dreams"/>
+              </a:rPr>
+              <a:t>Develop </a:t>
+            </a:r>
+            <a:r>
+              <a:rPr lang="en-US" sz="1000" dirty="0" smtClean="0">
+                <a:latin typeface="Caviar Dreams"/>
+                <a:cs typeface="Caviar Dreams"/>
+              </a:rPr>
+              <a:t>automated </a:t>
+            </a:r>
+            <a:r>
+              <a:rPr lang="en-US" sz="1000" dirty="0" smtClean="0">
+                <a:latin typeface="Caviar Dreams"/>
+                <a:cs typeface="Caviar Dreams"/>
+              </a:rPr>
+              <a:t>browser </a:t>
+            </a:r>
+            <a:r>
+              <a:rPr lang="en-US" sz="1000" dirty="0" smtClean="0">
+                <a:latin typeface="Caviar Dreams"/>
+                <a:cs typeface="Caviar Dreams"/>
+              </a:rPr>
+              <a:t>tests using Selenium and </a:t>
+            </a:r>
+            <a:r>
+              <a:rPr lang="en-US" sz="1000" dirty="0" smtClean="0">
+                <a:latin typeface="Caviar Dreams"/>
+                <a:cs typeface="Caviar Dreams"/>
+              </a:rPr>
+              <a:t>Nightwatch.js</a:t>
+            </a:r>
+            <a:r>
+              <a:rPr lang="en-US" sz="1000" dirty="0" smtClean="0">
+                <a:latin typeface="Caviar Dreams"/>
+                <a:cs typeface="Caviar Dreams"/>
+              </a:rPr>
+              <a:t> </a:t>
+            </a:r>
+            <a:r>
+              <a:rPr lang="en-US" sz="1000" dirty="0" smtClean="0">
+                <a:latin typeface="Caviar Dreams"/>
+                <a:cs typeface="Caviar Dreams"/>
+              </a:rPr>
+              <a:t>for </a:t>
+            </a:r>
+            <a:r>
+              <a:rPr lang="en-US" sz="1000" dirty="0" smtClean="0">
+                <a:latin typeface="Caviar Dreams"/>
+                <a:cs typeface="Caviar Dreams"/>
+              </a:rPr>
+              <a:t>the education marketing website</a:t>
+            </a:r>
+            <a:endParaRPr lang="en-US" sz="1000" dirty="0" smtClean="0">
+              <a:latin typeface="Caviar Dreams"/>
+              <a:cs typeface="Caviar Dreams"/>
+            </a:endParaRPr>
+          </a:p>
+          <a:p>
+            <a:pPr marL="171450" indent="-171450">
+              <a:buFont typeface="Arial"/>
+              <a:buChar char="•"/>
+            </a:pPr>
+            <a:r>
+              <a:rPr lang="en-US" sz="1000" dirty="0" smtClean="0">
+                <a:latin typeface="Caviar Dreams"/>
+                <a:cs typeface="Caviar Dreams"/>
+              </a:rPr>
+              <a:t>Design and develop a single-page application using </a:t>
+            </a:r>
+            <a:r>
+              <a:rPr lang="en-US" sz="1000" dirty="0" smtClean="0">
+                <a:latin typeface="Caviar Dreams"/>
+                <a:cs typeface="Caviar Dreams"/>
+              </a:rPr>
+              <a:t>Backbone.js</a:t>
+            </a:r>
+            <a:r>
+              <a:rPr lang="en-US" sz="1000" dirty="0" smtClean="0">
+                <a:latin typeface="Caviar Dreams"/>
+                <a:cs typeface="Caviar Dreams"/>
+              </a:rPr>
+              <a:t> </a:t>
+            </a:r>
+            <a:r>
+              <a:rPr lang="en-US" sz="1000" dirty="0" smtClean="0">
+                <a:latin typeface="Caviar Dreams"/>
+                <a:cs typeface="Caviar Dreams"/>
+              </a:rPr>
+              <a:t>to organize and render links to enterprise reports, resulting in </a:t>
+            </a:r>
+            <a:r>
+              <a:rPr lang="en-US" sz="1000" dirty="0" smtClean="0">
+                <a:latin typeface="Caviar Dreams"/>
+                <a:cs typeface="Caviar Dreams"/>
+              </a:rPr>
+              <a:t>a speedier </a:t>
+            </a:r>
+            <a:r>
+              <a:rPr lang="en-US" sz="1000" dirty="0" smtClean="0">
+                <a:latin typeface="Caviar Dreams"/>
+                <a:cs typeface="Caviar Dreams"/>
+              </a:rPr>
+              <a:t>user </a:t>
+            </a:r>
+            <a:r>
+              <a:rPr lang="en-US" sz="1000" dirty="0" smtClean="0">
+                <a:latin typeface="Caviar Dreams"/>
+                <a:cs typeface="Caviar Dreams"/>
+              </a:rPr>
+              <a:t>interface</a:t>
+            </a:r>
+            <a:endParaRPr lang="en-US" sz="1000" dirty="0" smtClean="0">
+              <a:latin typeface="Caviar Dreams"/>
+              <a:cs typeface="Caviar Dreams"/>
+            </a:endParaRPr>
+          </a:p>
+          <a:p>
+            <a:pPr marL="171450" indent="-171450">
+              <a:buFont typeface="Arial"/>
+              <a:buChar char="•"/>
+            </a:pPr>
+            <a:r>
+              <a:rPr lang="en-US" sz="1000" dirty="0" smtClean="0">
+                <a:latin typeface="Caviar Dreams"/>
+                <a:cs typeface="Caviar Dreams"/>
+              </a:rPr>
+              <a:t>Create  a single-page dashboard application </a:t>
+            </a:r>
+            <a:r>
+              <a:rPr lang="en-US" sz="1000" dirty="0" smtClean="0">
+                <a:latin typeface="Caviar Dreams"/>
+                <a:cs typeface="Caviar Dreams"/>
+              </a:rPr>
+              <a:t>that displays and </a:t>
+            </a:r>
+            <a:r>
+              <a:rPr lang="en-US" sz="1000" dirty="0" smtClean="0">
+                <a:latin typeface="Caviar Dreams"/>
+                <a:cs typeface="Caviar Dreams"/>
+              </a:rPr>
+              <a:t>sorts API data </a:t>
+            </a:r>
+            <a:r>
+              <a:rPr lang="en-US" sz="1000" dirty="0" smtClean="0">
+                <a:latin typeface="Caviar Dreams"/>
+                <a:cs typeface="Caviar Dreams"/>
+              </a:rPr>
+              <a:t>based on </a:t>
+            </a:r>
+            <a:r>
+              <a:rPr lang="en-US" sz="1000" dirty="0" smtClean="0">
+                <a:latin typeface="Caviar Dreams"/>
+                <a:cs typeface="Caviar Dreams"/>
+              </a:rPr>
+              <a:t>critical ranking, status and ascending/descending order</a:t>
+            </a:r>
+            <a:endParaRPr lang="en-US" sz="1000" dirty="0" smtClean="0">
+              <a:latin typeface="Caviar Dreams"/>
+              <a:cs typeface="Caviar Dreams"/>
+            </a:endParaRPr>
+          </a:p>
+        </p:txBody>
+      </p:sp>
+      <p:sp>
+        <p:nvSpPr>
+          <p:cNvPr id="3" name="Rectangle 2"/>
+          <p:cNvSpPr/>
+          <p:nvPr/>
+        </p:nvSpPr>
+        <p:spPr>
+          <a:xfrm>
+            <a:off x="3375045" y="979212"/>
+            <a:ext cx="3192748" cy="507831"/>
+          </a:xfrm>
+          <a:prstGeom prst="rect">
+            <a:avLst/>
+          </a:prstGeom>
+        </p:spPr>
+        <p:txBody>
+          <a:bodyPr wrap="square">
+            <a:spAutoFit/>
+          </a:bodyPr>
+          <a:lstStyle/>
+          <a:p>
+            <a:pPr lvl="0"/>
+            <a:r>
+              <a:rPr lang="en-US" sz="900" b="1" dirty="0">
+                <a:latin typeface="Caviar Dreams"/>
+                <a:cs typeface="Caviar Dreams"/>
+              </a:rPr>
+              <a:t>Styling/Design: </a:t>
+            </a:r>
+            <a:r>
+              <a:rPr lang="en-US" sz="900" dirty="0" smtClean="0">
+                <a:latin typeface="Caviar Dreams"/>
+                <a:cs typeface="Caviar Dreams"/>
+              </a:rPr>
+              <a:t>Skeleton, </a:t>
+            </a:r>
+            <a:r>
+              <a:rPr lang="en-US" sz="900" dirty="0" smtClean="0">
+                <a:latin typeface="Caviar Dreams"/>
+                <a:cs typeface="Caviar Dreams"/>
+              </a:rPr>
+              <a:t>Jeet.gs</a:t>
+            </a:r>
+            <a:r>
+              <a:rPr lang="en-US" sz="900" dirty="0" smtClean="0">
+                <a:latin typeface="Caviar Dreams"/>
+                <a:cs typeface="Caviar Dreams"/>
+              </a:rPr>
+              <a:t>, SASS</a:t>
+            </a:r>
+            <a:r>
+              <a:rPr lang="en-US" sz="900" dirty="0">
+                <a:latin typeface="Caviar Dreams"/>
+                <a:cs typeface="Caviar Dreams"/>
+              </a:rPr>
+              <a:t>, </a:t>
+            </a:r>
+            <a:r>
+              <a:rPr lang="en-US" sz="900" dirty="0" smtClean="0">
+                <a:latin typeface="Caviar Dreams"/>
+                <a:cs typeface="Caviar Dreams"/>
+              </a:rPr>
+              <a:t>Bourbon, Stylus</a:t>
+            </a:r>
+          </a:p>
+          <a:p>
+            <a:pPr lvl="0"/>
+            <a:r>
+              <a:rPr lang="en-US" sz="900" b="1" dirty="0" smtClean="0">
+                <a:latin typeface="Caviar Dreams"/>
+                <a:cs typeface="Caviar Dreams"/>
+              </a:rPr>
+              <a:t>Testing</a:t>
+            </a:r>
+            <a:r>
+              <a:rPr lang="en-US" sz="900" b="1" dirty="0">
+                <a:latin typeface="Caviar Dreams"/>
+                <a:cs typeface="Caviar Dreams"/>
+              </a:rPr>
+              <a:t>: </a:t>
+            </a:r>
+            <a:r>
+              <a:rPr lang="en-US" sz="900" dirty="0">
+                <a:latin typeface="Caviar Dreams"/>
+                <a:cs typeface="Caviar Dreams"/>
+              </a:rPr>
+              <a:t>RSpec</a:t>
+            </a:r>
+            <a:r>
+              <a:rPr lang="en-US" sz="900" dirty="0">
+                <a:latin typeface="Caviar Dreams"/>
+                <a:cs typeface="Caviar Dreams"/>
+              </a:rPr>
+              <a:t>, Selenium, </a:t>
+            </a:r>
+            <a:r>
+              <a:rPr lang="en-US" sz="900" dirty="0" smtClean="0">
+                <a:latin typeface="Caviar Dreams"/>
+                <a:cs typeface="Caviar Dreams"/>
+              </a:rPr>
+              <a:t>Nightwatch.js</a:t>
+            </a:r>
+            <a:endParaRPr lang="en-US" sz="900" dirty="0" smtClean="0">
+              <a:latin typeface="Caviar Dreams"/>
+              <a:cs typeface="Caviar Dreams"/>
+            </a:endParaRPr>
+          </a:p>
+          <a:p>
+            <a:r>
+              <a:rPr lang="en-US" sz="900" b="1" dirty="0">
+                <a:latin typeface="Caviar Dreams"/>
+                <a:cs typeface="Caviar Dreams"/>
+              </a:rPr>
+              <a:t>Database Tools: </a:t>
+            </a:r>
+            <a:r>
+              <a:rPr lang="en-US" sz="900" dirty="0">
+                <a:latin typeface="Caviar Dreams"/>
+                <a:cs typeface="Caviar Dreams"/>
+              </a:rPr>
+              <a:t>SQL, </a:t>
+            </a:r>
+            <a:r>
+              <a:rPr lang="en-US" sz="900" dirty="0">
+                <a:latin typeface="Caviar Dreams"/>
+                <a:cs typeface="Caviar Dreams"/>
+              </a:rPr>
+              <a:t>PostgreSQL</a:t>
+            </a:r>
+            <a:r>
+              <a:rPr lang="en-US" sz="900" dirty="0">
+                <a:latin typeface="Caviar Dreams"/>
+                <a:cs typeface="Caviar Dreams"/>
+              </a:rPr>
+              <a:t>, </a:t>
+            </a:r>
+            <a:r>
+              <a:rPr lang="en-US" sz="900" dirty="0" smtClean="0">
+                <a:latin typeface="Caviar Dreams"/>
+                <a:cs typeface="Caviar Dreams"/>
+              </a:rPr>
+              <a:t>ActiveRecord</a:t>
+            </a:r>
+            <a:endParaRPr lang="en-US" sz="900" dirty="0">
+              <a:latin typeface="Caviar Dreams"/>
+              <a:cs typeface="Caviar Dreams"/>
+            </a:endParaRPr>
+          </a:p>
+        </p:txBody>
+      </p:sp>
     </p:spTree>
     <p:extLst>
       <p:ext uri="{BB962C8B-B14F-4D97-AF65-F5344CB8AC3E}">

</xml_diff>